<commit_message>
CSI1101 A2: updated recommend passphrase
</commit_message>
<xml_diff>
--- a/year_1/sem_2/CSI1101_computer_security/0b_assignment_2_[22MAY15_0900]/dev/CSI1101_PONCE_A2_v02.pptx
+++ b/year_1/sem_2/CSI1101_computer_security/0b_assignment_2_[22MAY15_0900]/dev/CSI1101_PONCE_A2_v02.pptx
@@ -47,14 +47,14 @@
   <p:notesSz cx="6858000" cy="9144000"/>
   <p:embeddedFontLst>
     <p:embeddedFont>
-      <p:font typeface="Calibri" panose="020F0502020204030204" pitchFamily="34" charset="0"/>
+      <p:font typeface="Open Sans" panose="020B0606030504020204" pitchFamily="34" charset="0"/>
       <p:regular r:id="rId39"/>
       <p:bold r:id="rId40"/>
       <p:italic r:id="rId41"/>
       <p:boldItalic r:id="rId42"/>
     </p:embeddedFont>
     <p:embeddedFont>
-      <p:font typeface="Open Sans" panose="020B0606030504020204" pitchFamily="34" charset="0"/>
+      <p:font typeface="Calibri" panose="020F0502020204030204" pitchFamily="34" charset="0"/>
       <p:regular r:id="rId43"/>
       <p:bold r:id="rId44"/>
       <p:italic r:id="rId45"/>
@@ -311,7 +311,7 @@
           <a:p>
             <a:fld id="{7B1A49F8-424C-43DF-ABBC-6BF9F0D68733}" type="datetimeFigureOut">
               <a:rPr lang="en-AU" smtClean="0"/>
-              <a:t>13/05/2015</a:t>
+              <a:t>14/05/2015</a:t>
             </a:fld>
             <a:endParaRPr lang="en-AU"/>
           </a:p>
@@ -481,7 +481,7 @@
           <a:p>
             <a:fld id="{7B1A49F8-424C-43DF-ABBC-6BF9F0D68733}" type="datetimeFigureOut">
               <a:rPr lang="en-AU" smtClean="0"/>
-              <a:t>13/05/2015</a:t>
+              <a:t>14/05/2015</a:t>
             </a:fld>
             <a:endParaRPr lang="en-AU"/>
           </a:p>
@@ -661,7 +661,7 @@
           <a:p>
             <a:fld id="{7B1A49F8-424C-43DF-ABBC-6BF9F0D68733}" type="datetimeFigureOut">
               <a:rPr lang="en-AU" smtClean="0"/>
-              <a:t>13/05/2015</a:t>
+              <a:t>14/05/2015</a:t>
             </a:fld>
             <a:endParaRPr lang="en-AU"/>
           </a:p>
@@ -831,7 +831,7 @@
           <a:p>
             <a:fld id="{7B1A49F8-424C-43DF-ABBC-6BF9F0D68733}" type="datetimeFigureOut">
               <a:rPr lang="en-AU" smtClean="0"/>
-              <a:t>13/05/2015</a:t>
+              <a:t>14/05/2015</a:t>
             </a:fld>
             <a:endParaRPr lang="en-AU"/>
           </a:p>
@@ -1077,7 +1077,7 @@
           <a:p>
             <a:fld id="{7B1A49F8-424C-43DF-ABBC-6BF9F0D68733}" type="datetimeFigureOut">
               <a:rPr lang="en-AU" smtClean="0"/>
-              <a:t>13/05/2015</a:t>
+              <a:t>14/05/2015</a:t>
             </a:fld>
             <a:endParaRPr lang="en-AU"/>
           </a:p>
@@ -1309,7 +1309,7 @@
           <a:p>
             <a:fld id="{7B1A49F8-424C-43DF-ABBC-6BF9F0D68733}" type="datetimeFigureOut">
               <a:rPr lang="en-AU" smtClean="0"/>
-              <a:t>13/05/2015</a:t>
+              <a:t>14/05/2015</a:t>
             </a:fld>
             <a:endParaRPr lang="en-AU"/>
           </a:p>
@@ -1676,7 +1676,7 @@
           <a:p>
             <a:fld id="{7B1A49F8-424C-43DF-ABBC-6BF9F0D68733}" type="datetimeFigureOut">
               <a:rPr lang="en-AU" smtClean="0"/>
-              <a:t>13/05/2015</a:t>
+              <a:t>14/05/2015</a:t>
             </a:fld>
             <a:endParaRPr lang="en-AU"/>
           </a:p>
@@ -1794,7 +1794,7 @@
           <a:p>
             <a:fld id="{7B1A49F8-424C-43DF-ABBC-6BF9F0D68733}" type="datetimeFigureOut">
               <a:rPr lang="en-AU" smtClean="0"/>
-              <a:t>13/05/2015</a:t>
+              <a:t>14/05/2015</a:t>
             </a:fld>
             <a:endParaRPr lang="en-AU"/>
           </a:p>
@@ -1889,7 +1889,7 @@
           <a:p>
             <a:fld id="{7B1A49F8-424C-43DF-ABBC-6BF9F0D68733}" type="datetimeFigureOut">
               <a:rPr lang="en-AU" smtClean="0"/>
-              <a:t>13/05/2015</a:t>
+              <a:t>14/05/2015</a:t>
             </a:fld>
             <a:endParaRPr lang="en-AU"/>
           </a:p>
@@ -2166,7 +2166,7 @@
           <a:p>
             <a:fld id="{7B1A49F8-424C-43DF-ABBC-6BF9F0D68733}" type="datetimeFigureOut">
               <a:rPr lang="en-AU" smtClean="0"/>
-              <a:t>13/05/2015</a:t>
+              <a:t>14/05/2015</a:t>
             </a:fld>
             <a:endParaRPr lang="en-AU"/>
           </a:p>
@@ -2419,7 +2419,7 @@
           <a:p>
             <a:fld id="{7B1A49F8-424C-43DF-ABBC-6BF9F0D68733}" type="datetimeFigureOut">
               <a:rPr lang="en-AU" smtClean="0"/>
-              <a:t>13/05/2015</a:t>
+              <a:t>14/05/2015</a:t>
             </a:fld>
             <a:endParaRPr lang="en-AU"/>
           </a:p>
@@ -2632,7 +2632,7 @@
           <a:p>
             <a:fld id="{7B1A49F8-424C-43DF-ABBC-6BF9F0D68733}" type="datetimeFigureOut">
               <a:rPr lang="en-AU" smtClean="0"/>
-              <a:t>13/05/2015</a:t>
+              <a:t>14/05/2015</a:t>
             </a:fld>
             <a:endParaRPr lang="en-AU"/>
           </a:p>
@@ -3111,18 +3111,7 @@
                 <a:ea typeface="Open Sans" panose="020B0606030504020204" pitchFamily="34" charset="0"/>
                 <a:cs typeface="Open Sans" panose="020B0606030504020204" pitchFamily="34" charset="0"/>
               </a:rPr>
-              <a:t>or </a:t>
-            </a:r>
-            <a:r>
-              <a:rPr lang="en-AU" sz="5400" b="1" dirty="0" smtClean="0">
-                <a:solidFill>
-                  <a:srgbClr val="111111"/>
-                </a:solidFill>
-                <a:latin typeface="Open Sans" panose="020B0606030504020204" pitchFamily="34" charset="0"/>
-                <a:ea typeface="Open Sans" panose="020B0606030504020204" pitchFamily="34" charset="0"/>
-                <a:cs typeface="Open Sans" panose="020B0606030504020204" pitchFamily="34" charset="0"/>
-              </a:rPr>
-              <a:t>Blue Ink</a:t>
+              <a:t>or Blue Ink</a:t>
             </a:r>
           </a:p>
           <a:p>
@@ -3217,11 +3206,11 @@
   <p:clrMapOvr>
     <a:masterClrMapping/>
   </p:clrMapOvr>
-  <mc:AlternateContent xmlns:mc="http://schemas.openxmlformats.org/markup-compatibility/2006">
-    <mc:Choice xmlns:p14="http://schemas.microsoft.com/office/powerpoint/2010/main" Requires="p14">
+  <mc:AlternateContent xmlns:mc="http://schemas.openxmlformats.org/markup-compatibility/2006" xmlns:p14="http://schemas.microsoft.com/office/powerpoint/2010/main">
+    <mc:Choice Requires="p14">
       <p:transition p14:dur="0"/>
     </mc:Choice>
-    <mc:Fallback>
+    <mc:Fallback xmlns="">
       <p:transition/>
     </mc:Fallback>
   </mc:AlternateContent>
@@ -3405,18 +3394,7 @@
                 <a:ea typeface="Open Sans" panose="020B0606030504020204" pitchFamily="34" charset="0"/>
                 <a:cs typeface="Open Sans" panose="020B0606030504020204" pitchFamily="34" charset="0"/>
               </a:rPr>
-              <a:t>Reports </a:t>
-            </a:r>
-            <a:r>
-              <a:rPr lang="en-AU" sz="2600" dirty="0" smtClean="0">
-                <a:solidFill>
-                  <a:srgbClr val="111111"/>
-                </a:solidFill>
-                <a:latin typeface="Open Sans" panose="020B0606030504020204" pitchFamily="34" charset="0"/>
-                <a:ea typeface="Open Sans" panose="020B0606030504020204" pitchFamily="34" charset="0"/>
-                <a:cs typeface="Open Sans" panose="020B0606030504020204" pitchFamily="34" charset="0"/>
-              </a:rPr>
-              <a:t>the vulnerabilities that the patches resolve</a:t>
+              <a:t>Reports the vulnerabilities that the patches resolve</a:t>
             </a:r>
           </a:p>
           <a:p>
@@ -5330,8 +5308,27 @@
                 <a:ea typeface="Open Sans" panose="020B0606030504020204" pitchFamily="34" charset="0"/>
                 <a:cs typeface="Open Sans" panose="020B0606030504020204" pitchFamily="34" charset="0"/>
               </a:rPr>
-              <a:t>Recommend Blue Ink adopt a similar password strategy</a:t>
-            </a:r>
+              <a:t>Recommend Blue Ink adopt a similar password </a:t>
+            </a:r>
+            <a:r>
+              <a:rPr lang="en-AU" sz="2600" dirty="0" smtClean="0">
+                <a:solidFill>
+                  <a:srgbClr val="111111"/>
+                </a:solidFill>
+                <a:latin typeface="Open Sans" panose="020B0606030504020204" pitchFamily="34" charset="0"/>
+                <a:ea typeface="Open Sans" panose="020B0606030504020204" pitchFamily="34" charset="0"/>
+                <a:cs typeface="Open Sans" panose="020B0606030504020204" pitchFamily="34" charset="0"/>
+              </a:rPr>
+              <a:t>policy</a:t>
+            </a:r>
+            <a:endParaRPr lang="en-AU" sz="2600" dirty="0" smtClean="0">
+              <a:solidFill>
+                <a:srgbClr val="111111"/>
+              </a:solidFill>
+              <a:latin typeface="Open Sans" panose="020B0606030504020204" pitchFamily="34" charset="0"/>
+              <a:ea typeface="Open Sans" panose="020B0606030504020204" pitchFamily="34" charset="0"/>
+              <a:cs typeface="Open Sans" panose="020B0606030504020204" pitchFamily="34" charset="0"/>
+            </a:endParaRPr>
           </a:p>
           <a:p>
             <a:pPr marL="285750" indent="-285750">
@@ -5667,14 +5664,6 @@
               </a:rPr>
               <a:t>An attacker could easily read password if gained access to computer</a:t>
             </a:r>
-            <a:endParaRPr lang="en-AU" sz="2600" dirty="0" smtClean="0">
-              <a:solidFill>
-                <a:srgbClr val="111111"/>
-              </a:solidFill>
-              <a:latin typeface="Open Sans" panose="020B0606030504020204" pitchFamily="34" charset="0"/>
-              <a:ea typeface="Open Sans" panose="020B0606030504020204" pitchFamily="34" charset="0"/>
-              <a:cs typeface="Open Sans" panose="020B0606030504020204" pitchFamily="34" charset="0"/>
-            </a:endParaRPr>
           </a:p>
         </p:txBody>
       </p:sp>
@@ -7584,38 +7573,8 @@
                 <a:ea typeface="Open Sans" panose="020B0606030504020204" pitchFamily="34" charset="0"/>
                 <a:cs typeface="Open Sans" panose="020B0606030504020204" pitchFamily="34" charset="0"/>
               </a:rPr>
-              <a:t>Blue </a:t>
-            </a:r>
-            <a:r>
-              <a:rPr lang="en-AU" sz="2800" dirty="0" smtClean="0">
-                <a:solidFill>
-                  <a:srgbClr val="111111"/>
-                </a:solidFill>
-                <a:latin typeface="Open Sans" panose="020B0606030504020204" pitchFamily="34" charset="0"/>
-                <a:ea typeface="Open Sans" panose="020B0606030504020204" pitchFamily="34" charset="0"/>
-                <a:cs typeface="Open Sans" panose="020B0606030504020204" pitchFamily="34" charset="0"/>
-              </a:rPr>
-              <a:t>Ink is a large </a:t>
-            </a:r>
-            <a:r>
-              <a:rPr lang="en-AU" sz="2800" dirty="0" smtClean="0">
-                <a:solidFill>
-                  <a:srgbClr val="111111"/>
-                </a:solidFill>
-                <a:latin typeface="Open Sans" panose="020B0606030504020204" pitchFamily="34" charset="0"/>
-                <a:ea typeface="Open Sans" panose="020B0606030504020204" pitchFamily="34" charset="0"/>
-                <a:cs typeface="Open Sans" panose="020B0606030504020204" pitchFamily="34" charset="0"/>
-              </a:rPr>
-              <a:t>enterprise, corporate environment</a:t>
-            </a:r>
-            <a:endParaRPr lang="en-AU" sz="2800" dirty="0" smtClean="0">
-              <a:solidFill>
-                <a:srgbClr val="111111"/>
-              </a:solidFill>
-              <a:latin typeface="Open Sans" panose="020B0606030504020204" pitchFamily="34" charset="0"/>
-              <a:ea typeface="Open Sans" panose="020B0606030504020204" pitchFamily="34" charset="0"/>
-              <a:cs typeface="Open Sans" panose="020B0606030504020204" pitchFamily="34" charset="0"/>
-            </a:endParaRPr>
+              <a:t>Blue Ink is a large enterprise, corporate environment</a:t>
+            </a:r>
           </a:p>
           <a:p>
             <a:pPr marL="457200" indent="-457200" algn="l">
@@ -7636,14 +7595,6 @@
               </a:rPr>
               <a:t>Blue Ink has at least one Windows based server capable of Active Directory</a:t>
             </a:r>
-            <a:endParaRPr lang="en-AU" sz="2800" dirty="0" smtClean="0">
-              <a:solidFill>
-                <a:srgbClr val="111111"/>
-              </a:solidFill>
-              <a:latin typeface="Open Sans" panose="020B0606030504020204" pitchFamily="34" charset="0"/>
-              <a:ea typeface="Open Sans" panose="020B0606030504020204" pitchFamily="34" charset="0"/>
-              <a:cs typeface="Open Sans" panose="020B0606030504020204" pitchFamily="34" charset="0"/>
-            </a:endParaRPr>
           </a:p>
           <a:p>
             <a:pPr marL="457200" indent="-457200" algn="l">
@@ -7662,40 +7613,7 @@
                 <a:ea typeface="Open Sans" panose="020B0606030504020204" pitchFamily="34" charset="0"/>
                 <a:cs typeface="Open Sans" panose="020B0606030504020204" pitchFamily="34" charset="0"/>
               </a:rPr>
-              <a:t>A firewall </a:t>
-            </a:r>
-            <a:r>
-              <a:rPr lang="en-AU" sz="2800" dirty="0" smtClean="0">
-                <a:solidFill>
-                  <a:srgbClr val="111111"/>
-                </a:solidFill>
-                <a:latin typeface="Open Sans" panose="020B0606030504020204" pitchFamily="34" charset="0"/>
-                <a:ea typeface="Open Sans" panose="020B0606030504020204" pitchFamily="34" charset="0"/>
-                <a:cs typeface="Open Sans" panose="020B0606030504020204" pitchFamily="34" charset="0"/>
-              </a:rPr>
-              <a:t>is in place, </a:t>
-            </a:r>
-            <a:r>
-              <a:rPr lang="en-AU" sz="2800" dirty="0" smtClean="0">
-                <a:solidFill>
-                  <a:srgbClr val="111111"/>
-                </a:solidFill>
-                <a:latin typeface="Open Sans" panose="020B0606030504020204" pitchFamily="34" charset="0"/>
-                <a:ea typeface="Open Sans" panose="020B0606030504020204" pitchFamily="34" charset="0"/>
-                <a:cs typeface="Open Sans" panose="020B0606030504020204" pitchFamily="34" charset="0"/>
-              </a:rPr>
-              <a:t>protects </a:t>
-            </a:r>
-            <a:r>
-              <a:rPr lang="en-AU" sz="2800" dirty="0" smtClean="0">
-                <a:solidFill>
-                  <a:srgbClr val="111111"/>
-                </a:solidFill>
-                <a:latin typeface="Open Sans" panose="020B0606030504020204" pitchFamily="34" charset="0"/>
-                <a:ea typeface="Open Sans" panose="020B0606030504020204" pitchFamily="34" charset="0"/>
-                <a:cs typeface="Open Sans" panose="020B0606030504020204" pitchFamily="34" charset="0"/>
-              </a:rPr>
-              <a:t>network and is out of scope</a:t>
+              <a:t>A firewall is in place, protects network and is out of scope</a:t>
             </a:r>
           </a:p>
           <a:p>
@@ -10413,14 +10331,6 @@
               </a:rPr>
               <a:t>Passwords</a:t>
             </a:r>
-            <a:endParaRPr lang="en-AU" sz="2800" dirty="0" smtClean="0">
-              <a:solidFill>
-                <a:srgbClr val="111111"/>
-              </a:solidFill>
-              <a:latin typeface="Open Sans" panose="020B0606030504020204" pitchFamily="34" charset="0"/>
-              <a:ea typeface="Open Sans" panose="020B0606030504020204" pitchFamily="34" charset="0"/>
-              <a:cs typeface="Open Sans" panose="020B0606030504020204" pitchFamily="34" charset="0"/>
-            </a:endParaRPr>
           </a:p>
           <a:p>
             <a:pPr marL="457200" indent="-457200" algn="l">
@@ -10479,7 +10389,7 @@
                 <a:ea typeface="Open Sans" panose="020B0606030504020204" pitchFamily="34" charset="0"/>
                 <a:cs typeface="Open Sans" panose="020B0606030504020204" pitchFamily="34" charset="0"/>
               </a:rPr>
-              <a:t>Anti-virus</a:t>
+              <a:t>Anti-virus and network security</a:t>
             </a:r>
             <a:endParaRPr lang="en-AU" sz="2800" dirty="0" smtClean="0">
               <a:solidFill>
@@ -11396,18 +11306,7 @@
                 <a:ea typeface="Open Sans" panose="020B0606030504020204" pitchFamily="34" charset="0"/>
                 <a:cs typeface="Open Sans" panose="020B0606030504020204" pitchFamily="34" charset="0"/>
               </a:rPr>
-              <a:t>Proactive p</a:t>
-            </a:r>
-            <a:r>
-              <a:rPr lang="en-AU" sz="3600" b="1" dirty="0" smtClean="0">
-                <a:solidFill>
-                  <a:srgbClr val="111111"/>
-                </a:solidFill>
-                <a:latin typeface="Open Sans" panose="020B0606030504020204" pitchFamily="34" charset="0"/>
-                <a:ea typeface="Open Sans" panose="020B0606030504020204" pitchFamily="34" charset="0"/>
-                <a:cs typeface="Open Sans" panose="020B0606030504020204" pitchFamily="34" charset="0"/>
-              </a:rPr>
-              <a:t>atch management</a:t>
+              <a:t>Proactive patch management</a:t>
             </a:r>
             <a:r>
               <a:rPr lang="en-AU" sz="4400" b="1" dirty="0" smtClean="0">
@@ -11505,18 +11404,7 @@
                 <a:ea typeface="Open Sans" panose="020B0606030504020204" pitchFamily="34" charset="0"/>
                 <a:cs typeface="Open Sans" panose="020B0606030504020204" pitchFamily="34" charset="0"/>
               </a:rPr>
-              <a:t>Security issues</a:t>
-            </a:r>
-            <a:r>
-              <a:rPr lang="en-AU" sz="2600" dirty="0" smtClean="0">
-                <a:solidFill>
-                  <a:srgbClr val="111111"/>
-                </a:solidFill>
-                <a:latin typeface="Open Sans" panose="020B0606030504020204" pitchFamily="34" charset="0"/>
-                <a:ea typeface="Open Sans" panose="020B0606030504020204" pitchFamily="34" charset="0"/>
-                <a:cs typeface="Open Sans" panose="020B0606030504020204" pitchFamily="34" charset="0"/>
-              </a:rPr>
-              <a:t> that can occur have been identified and patches have already been released</a:t>
+              <a:t>Security issues that can occur have been identified and patches have already been released</a:t>
             </a:r>
           </a:p>
           <a:p>

</xml_diff>

<commit_message>
CSI1101 A2: finished v2
</commit_message>
<xml_diff>
--- a/year_1/sem_2/CSI1101_computer_security/0b_assignment_2_[22MAY15_0900]/dev/CSI1101_PONCE_A2_v02.pptx
+++ b/year_1/sem_2/CSI1101_computer_security/0b_assignment_2_[22MAY15_0900]/dev/CSI1101_PONCE_A2_v02.pptx
@@ -47,23 +47,23 @@
   <p:notesSz cx="6858000" cy="9144000"/>
   <p:embeddedFontLst>
     <p:embeddedFont>
+      <p:font typeface="Calibri Light" panose="020F0302020204030204" pitchFamily="34" charset="0"/>
+      <p:regular r:id="rId39"/>
+      <p:italic r:id="rId40"/>
+    </p:embeddedFont>
+    <p:embeddedFont>
       <p:font typeface="Open Sans" panose="020B0606030504020204" pitchFamily="34" charset="0"/>
-      <p:regular r:id="rId39"/>
-      <p:bold r:id="rId40"/>
-      <p:italic r:id="rId41"/>
-      <p:boldItalic r:id="rId42"/>
+      <p:regular r:id="rId41"/>
+      <p:bold r:id="rId42"/>
+      <p:italic r:id="rId43"/>
+      <p:boldItalic r:id="rId44"/>
     </p:embeddedFont>
     <p:embeddedFont>
       <p:font typeface="Calibri" panose="020F0502020204030204" pitchFamily="34" charset="0"/>
-      <p:regular r:id="rId43"/>
-      <p:bold r:id="rId44"/>
-      <p:italic r:id="rId45"/>
-      <p:boldItalic r:id="rId46"/>
-    </p:embeddedFont>
-    <p:embeddedFont>
-      <p:font typeface="Calibri Light" panose="020F0302020204030204" pitchFamily="34" charset="0"/>
-      <p:regular r:id="rId47"/>
-      <p:italic r:id="rId48"/>
+      <p:regular r:id="rId45"/>
+      <p:bold r:id="rId46"/>
+      <p:italic r:id="rId47"/>
+      <p:boldItalic r:id="rId48"/>
     </p:embeddedFont>
   </p:embeddedFontLst>
   <p:defaultTextStyle>
@@ -3556,7 +3556,7 @@
                 <a:ea typeface="Open Sans" panose="020B0606030504020204" pitchFamily="34" charset="0"/>
                 <a:cs typeface="Open Sans" panose="020B0606030504020204" pitchFamily="34" charset="0"/>
               </a:rPr>
-              <a:t>Video:</a:t>
+              <a:t>SolarWinds Patch Manager</a:t>
             </a:r>
             <a:br>
               <a:rPr lang="en-AU" sz="3600" b="1" dirty="0" smtClean="0">
@@ -3576,9 +3576,31 @@
                 <a:latin typeface="Open Sans" panose="020B0606030504020204" pitchFamily="34" charset="0"/>
                 <a:ea typeface="Open Sans" panose="020B0606030504020204" pitchFamily="34" charset="0"/>
                 <a:cs typeface="Open Sans" panose="020B0606030504020204" pitchFamily="34" charset="0"/>
+              </a:rPr>
+              <a:t>Guided Tour </a:t>
+            </a:r>
+            <a:r>
+              <a:rPr lang="en-AU" sz="3600" b="1" dirty="0" smtClean="0">
+                <a:solidFill>
+                  <a:srgbClr val="111111"/>
+                </a:solidFill>
+                <a:latin typeface="Open Sans" panose="020B0606030504020204" pitchFamily="34" charset="0"/>
+                <a:ea typeface="Open Sans" panose="020B0606030504020204" pitchFamily="34" charset="0"/>
+                <a:cs typeface="Open Sans" panose="020B0606030504020204" pitchFamily="34" charset="0"/>
                 <a:hlinkClick r:id="rId3"/>
               </a:rPr>
-              <a:t>SolarWinds Patch Manager 2.1</a:t>
+              <a:t>(Tice, 2012)</a:t>
+            </a:r>
+            <a:r>
+              <a:rPr lang="en-AU" sz="3600" b="1" dirty="0" smtClean="0">
+                <a:solidFill>
+                  <a:srgbClr val="111111"/>
+                </a:solidFill>
+                <a:latin typeface="Open Sans" panose="020B0606030504020204" pitchFamily="34" charset="0"/>
+                <a:ea typeface="Open Sans" panose="020B0606030504020204" pitchFamily="34" charset="0"/>
+                <a:cs typeface="Open Sans" panose="020B0606030504020204" pitchFamily="34" charset="0"/>
+              </a:rPr>
+              <a:t>:</a:t>
             </a:r>
             <a:endParaRPr lang="en-AU" sz="3600" dirty="0">
               <a:solidFill>
@@ -4404,7 +4426,43 @@
                 <a:cs typeface="Open Sans" panose="020B0606030504020204" pitchFamily="34" charset="0"/>
                 <a:hlinkClick r:id="rId4"/>
               </a:rPr>
-              <a:t>(Microsoft n.d.)</a:t>
+              <a:t>(Microsoft </a:t>
+            </a:r>
+            <a:r>
+              <a:rPr lang="en-AU" sz="2600" dirty="0" err="1" smtClean="0">
+                <a:solidFill>
+                  <a:srgbClr val="111111"/>
+                </a:solidFill>
+                <a:latin typeface="Open Sans" panose="020B0606030504020204" pitchFamily="34" charset="0"/>
+                <a:ea typeface="Open Sans" panose="020B0606030504020204" pitchFamily="34" charset="0"/>
+                <a:cs typeface="Open Sans" panose="020B0606030504020204" pitchFamily="34" charset="0"/>
+                <a:hlinkClick r:id="rId4"/>
+              </a:rPr>
+              <a:t>n.d</a:t>
+            </a:r>
+            <a:r>
+              <a:rPr lang="en-AU" sz="2600" dirty="0" err="1" smtClean="0">
+                <a:solidFill>
+                  <a:srgbClr val="111111"/>
+                </a:solidFill>
+                <a:latin typeface="Open Sans" panose="020B0606030504020204" pitchFamily="34" charset="0"/>
+                <a:ea typeface="Open Sans" panose="020B0606030504020204" pitchFamily="34" charset="0"/>
+                <a:cs typeface="Open Sans" panose="020B0606030504020204" pitchFamily="34" charset="0"/>
+                <a:hlinkClick r:id="rId4"/>
+              </a:rPr>
+              <a:t>.</a:t>
+            </a:r>
+            <a:r>
+              <a:rPr lang="en-AU" sz="2600" dirty="0" smtClean="0">
+                <a:solidFill>
+                  <a:srgbClr val="111111"/>
+                </a:solidFill>
+                <a:latin typeface="Open Sans" panose="020B0606030504020204" pitchFamily="34" charset="0"/>
+                <a:ea typeface="Open Sans" panose="020B0606030504020204" pitchFamily="34" charset="0"/>
+                <a:cs typeface="Open Sans" panose="020B0606030504020204" pitchFamily="34" charset="0"/>
+                <a:hlinkClick r:id="rId4"/>
+              </a:rPr>
+              <a:t>-a)</a:t>
             </a:r>
             <a:endParaRPr lang="en-AU" sz="2600" dirty="0" smtClean="0">
               <a:solidFill>
@@ -4554,7 +4612,18 @@
                 <a:ea typeface="Open Sans" panose="020B0606030504020204" pitchFamily="34" charset="0"/>
                 <a:cs typeface="Open Sans" panose="020B0606030504020204" pitchFamily="34" charset="0"/>
               </a:rPr>
-              <a:t>Admin can enforce password policy</a:t>
+              <a:t>Enforce </a:t>
+            </a:r>
+            <a:r>
+              <a:rPr lang="en-AU" sz="2600" dirty="0" smtClean="0">
+                <a:solidFill>
+                  <a:srgbClr val="111111"/>
+                </a:solidFill>
+                <a:latin typeface="Open Sans" panose="020B0606030504020204" pitchFamily="34" charset="0"/>
+                <a:ea typeface="Open Sans" panose="020B0606030504020204" pitchFamily="34" charset="0"/>
+                <a:cs typeface="Open Sans" panose="020B0606030504020204" pitchFamily="34" charset="0"/>
+              </a:rPr>
+              <a:t>password policy</a:t>
             </a:r>
           </a:p>
           <a:p>
@@ -4571,7 +4640,18 @@
                 <a:ea typeface="Open Sans" panose="020B0606030504020204" pitchFamily="34" charset="0"/>
                 <a:cs typeface="Open Sans" panose="020B0606030504020204" pitchFamily="34" charset="0"/>
               </a:rPr>
-              <a:t>Admin can assign and enforce security policies for users and computers</a:t>
+              <a:t>Assign </a:t>
+            </a:r>
+            <a:r>
+              <a:rPr lang="en-AU" sz="2600" dirty="0" smtClean="0">
+                <a:solidFill>
+                  <a:srgbClr val="111111"/>
+                </a:solidFill>
+                <a:latin typeface="Open Sans" panose="020B0606030504020204" pitchFamily="34" charset="0"/>
+                <a:ea typeface="Open Sans" panose="020B0606030504020204" pitchFamily="34" charset="0"/>
+                <a:cs typeface="Open Sans" panose="020B0606030504020204" pitchFamily="34" charset="0"/>
+              </a:rPr>
+              <a:t>and enforce security policies for users and computers</a:t>
             </a:r>
           </a:p>
           <a:p>
@@ -4622,7 +4702,18 @@
                 <a:ea typeface="Open Sans" panose="020B0606030504020204" pitchFamily="34" charset="0"/>
                 <a:cs typeface="Open Sans" panose="020B0606030504020204" pitchFamily="34" charset="0"/>
               </a:rPr>
-              <a:t>Mitigates brute-force attacks</a:t>
+              <a:t>Mitigate </a:t>
+            </a:r>
+            <a:r>
+              <a:rPr lang="en-AU" sz="2600" dirty="0" smtClean="0">
+                <a:solidFill>
+                  <a:srgbClr val="111111"/>
+                </a:solidFill>
+                <a:latin typeface="Open Sans" panose="020B0606030504020204" pitchFamily="34" charset="0"/>
+                <a:ea typeface="Open Sans" panose="020B0606030504020204" pitchFamily="34" charset="0"/>
+                <a:cs typeface="Open Sans" panose="020B0606030504020204" pitchFamily="34" charset="0"/>
+              </a:rPr>
+              <a:t>brute-force attacks</a:t>
             </a:r>
           </a:p>
         </p:txBody>
@@ -5308,27 +5399,8 @@
                 <a:ea typeface="Open Sans" panose="020B0606030504020204" pitchFamily="34" charset="0"/>
                 <a:cs typeface="Open Sans" panose="020B0606030504020204" pitchFamily="34" charset="0"/>
               </a:rPr>
-              <a:t>Recommend Blue Ink adopt a similar password </a:t>
-            </a:r>
-            <a:r>
-              <a:rPr lang="en-AU" sz="2600" dirty="0" smtClean="0">
-                <a:solidFill>
-                  <a:srgbClr val="111111"/>
-                </a:solidFill>
-                <a:latin typeface="Open Sans" panose="020B0606030504020204" pitchFamily="34" charset="0"/>
-                <a:ea typeface="Open Sans" panose="020B0606030504020204" pitchFamily="34" charset="0"/>
-                <a:cs typeface="Open Sans" panose="020B0606030504020204" pitchFamily="34" charset="0"/>
-              </a:rPr>
-              <a:t>policy</a:t>
-            </a:r>
-            <a:endParaRPr lang="en-AU" sz="2600" dirty="0" smtClean="0">
-              <a:solidFill>
-                <a:srgbClr val="111111"/>
-              </a:solidFill>
-              <a:latin typeface="Open Sans" panose="020B0606030504020204" pitchFamily="34" charset="0"/>
-              <a:ea typeface="Open Sans" panose="020B0606030504020204" pitchFamily="34" charset="0"/>
-              <a:cs typeface="Open Sans" panose="020B0606030504020204" pitchFamily="34" charset="0"/>
-            </a:endParaRPr>
+              <a:t>Recommend Blue Ink adopt a similar password policy</a:t>
+            </a:r>
           </a:p>
           <a:p>
             <a:pPr marL="285750" indent="-285750">
@@ -5344,7 +5416,18 @@
                 <a:ea typeface="Open Sans" panose="020B0606030504020204" pitchFamily="34" charset="0"/>
                 <a:cs typeface="Open Sans" panose="020B0606030504020204" pitchFamily="34" charset="0"/>
               </a:rPr>
-              <a:t>Minimizes risk that a user will write password down on paper or save in plaintext</a:t>
+              <a:t>Minimize </a:t>
+            </a:r>
+            <a:r>
+              <a:rPr lang="en-AU" sz="2600" dirty="0" smtClean="0">
+                <a:solidFill>
+                  <a:srgbClr val="111111"/>
+                </a:solidFill>
+                <a:latin typeface="Open Sans" panose="020B0606030504020204" pitchFamily="34" charset="0"/>
+                <a:ea typeface="Open Sans" panose="020B0606030504020204" pitchFamily="34" charset="0"/>
+                <a:cs typeface="Open Sans" panose="020B0606030504020204" pitchFamily="34" charset="0"/>
+              </a:rPr>
+              <a:t>risk that a user will write password down on paper or save in plaintext</a:t>
             </a:r>
             <a:endParaRPr lang="en-AU" sz="2600" dirty="0">
               <a:solidFill>
@@ -6783,7 +6866,18 @@
                 <a:ea typeface="Open Sans" panose="020B0606030504020204" pitchFamily="34" charset="0"/>
                 <a:cs typeface="Open Sans" panose="020B0606030504020204" pitchFamily="34" charset="0"/>
               </a:rPr>
-              <a:t>Mitigates possible changes made by malware</a:t>
+              <a:t>Mitigate </a:t>
+            </a:r>
+            <a:r>
+              <a:rPr lang="en-AU" sz="2600" dirty="0" smtClean="0">
+                <a:solidFill>
+                  <a:srgbClr val="111111"/>
+                </a:solidFill>
+                <a:latin typeface="Open Sans" panose="020B0606030504020204" pitchFamily="34" charset="0"/>
+                <a:ea typeface="Open Sans" panose="020B0606030504020204" pitchFamily="34" charset="0"/>
+                <a:cs typeface="Open Sans" panose="020B0606030504020204" pitchFamily="34" charset="0"/>
+              </a:rPr>
+              <a:t>possible changes made by malware</a:t>
             </a:r>
           </a:p>
           <a:p>
@@ -6817,7 +6911,18 @@
                 <a:ea typeface="Open Sans" panose="020B0606030504020204" pitchFamily="34" charset="0"/>
                 <a:cs typeface="Open Sans" panose="020B0606030504020204" pitchFamily="34" charset="0"/>
               </a:rPr>
-              <a:t>Mitigates possible malware propagation</a:t>
+              <a:t>Mitigate </a:t>
+            </a:r>
+            <a:r>
+              <a:rPr lang="en-AU" sz="2600" dirty="0" smtClean="0">
+                <a:solidFill>
+                  <a:srgbClr val="111111"/>
+                </a:solidFill>
+                <a:latin typeface="Open Sans" panose="020B0606030504020204" pitchFamily="34" charset="0"/>
+                <a:ea typeface="Open Sans" panose="020B0606030504020204" pitchFamily="34" charset="0"/>
+                <a:cs typeface="Open Sans" panose="020B0606030504020204" pitchFamily="34" charset="0"/>
+              </a:rPr>
+              <a:t>possible malware propagation</a:t>
             </a:r>
           </a:p>
           <a:p>
@@ -7016,7 +7121,19 @@
                 <a:cs typeface="Open Sans" panose="020B0606030504020204" pitchFamily="34" charset="0"/>
                 <a:hlinkClick r:id="rId2"/>
               </a:rPr>
-              <a:t>(Microsoft, n.d.)</a:t>
+              <a:t>(Microsoft, n.d</a:t>
+            </a:r>
+            <a:r>
+              <a:rPr lang="en-AU" sz="2600" dirty="0" smtClean="0">
+                <a:solidFill>
+                  <a:srgbClr val="111111"/>
+                </a:solidFill>
+                <a:latin typeface="Open Sans" panose="020B0606030504020204" pitchFamily="34" charset="0"/>
+                <a:ea typeface="Open Sans" panose="020B0606030504020204" pitchFamily="34" charset="0"/>
+                <a:cs typeface="Open Sans" panose="020B0606030504020204" pitchFamily="34" charset="0"/>
+                <a:hlinkClick r:id="rId2"/>
+              </a:rPr>
+              <a:t>.-b)</a:t>
             </a:r>
             <a:endParaRPr lang="en-AU" sz="2600" dirty="0">
               <a:solidFill>
@@ -7252,7 +7369,18 @@
                 <a:ea typeface="Open Sans" panose="020B0606030504020204" pitchFamily="34" charset="0"/>
                 <a:cs typeface="Open Sans" panose="020B0606030504020204" pitchFamily="34" charset="0"/>
               </a:rPr>
-              <a:t>Mitigates changes made by malware</a:t>
+              <a:t>Mitigate possible changes </a:t>
+            </a:r>
+            <a:r>
+              <a:rPr lang="en-AU" sz="2600" dirty="0" smtClean="0">
+                <a:solidFill>
+                  <a:srgbClr val="111111"/>
+                </a:solidFill>
+                <a:latin typeface="Open Sans" panose="020B0606030504020204" pitchFamily="34" charset="0"/>
+                <a:ea typeface="Open Sans" panose="020B0606030504020204" pitchFamily="34" charset="0"/>
+                <a:cs typeface="Open Sans" panose="020B0606030504020204" pitchFamily="34" charset="0"/>
+              </a:rPr>
+              <a:t>made by malware</a:t>
             </a:r>
           </a:p>
           <a:p>
@@ -7269,7 +7397,18 @@
                 <a:ea typeface="Open Sans" panose="020B0606030504020204" pitchFamily="34" charset="0"/>
                 <a:cs typeface="Open Sans" panose="020B0606030504020204" pitchFamily="34" charset="0"/>
               </a:rPr>
-              <a:t>Mitigates possible malware propagation</a:t>
+              <a:t>Mitigate </a:t>
+            </a:r>
+            <a:r>
+              <a:rPr lang="en-AU" sz="2600" dirty="0" smtClean="0">
+                <a:solidFill>
+                  <a:srgbClr val="111111"/>
+                </a:solidFill>
+                <a:latin typeface="Open Sans" panose="020B0606030504020204" pitchFamily="34" charset="0"/>
+                <a:ea typeface="Open Sans" panose="020B0606030504020204" pitchFamily="34" charset="0"/>
+                <a:cs typeface="Open Sans" panose="020B0606030504020204" pitchFamily="34" charset="0"/>
+              </a:rPr>
+              <a:t>possible malware propagation</a:t>
             </a:r>
           </a:p>
         </p:txBody>
@@ -7593,8 +7732,27 @@
                 <a:ea typeface="Open Sans" panose="020B0606030504020204" pitchFamily="34" charset="0"/>
                 <a:cs typeface="Open Sans" panose="020B0606030504020204" pitchFamily="34" charset="0"/>
               </a:rPr>
-              <a:t>Blue Ink has at least one Windows based server capable of Active Directory</a:t>
-            </a:r>
+              <a:t>Blue Ink has at least one Windows based server capable of </a:t>
+            </a:r>
+            <a:r>
+              <a:rPr lang="en-AU" sz="2800" dirty="0" smtClean="0">
+                <a:solidFill>
+                  <a:srgbClr val="111111"/>
+                </a:solidFill>
+                <a:latin typeface="Open Sans" panose="020B0606030504020204" pitchFamily="34" charset="0"/>
+                <a:ea typeface="Open Sans" panose="020B0606030504020204" pitchFamily="34" charset="0"/>
+                <a:cs typeface="Open Sans" panose="020B0606030504020204" pitchFamily="34" charset="0"/>
+              </a:rPr>
+              <a:t>Active Directory</a:t>
+            </a:r>
+            <a:endParaRPr lang="en-AU" sz="2800" dirty="0" smtClean="0">
+              <a:solidFill>
+                <a:srgbClr val="111111"/>
+              </a:solidFill>
+              <a:latin typeface="Open Sans" panose="020B0606030504020204" pitchFamily="34" charset="0"/>
+              <a:ea typeface="Open Sans" panose="020B0606030504020204" pitchFamily="34" charset="0"/>
+              <a:cs typeface="Open Sans" panose="020B0606030504020204" pitchFamily="34" charset="0"/>
+            </a:endParaRPr>
           </a:p>
           <a:p>
             <a:pPr marL="457200" indent="-457200" algn="l">
@@ -9578,8 +9736,28 @@
                 <a:ea typeface="Open Sans" panose="020B0606030504020204" pitchFamily="34" charset="0"/>
                 <a:cs typeface="Open Sans" panose="020B0606030504020204" pitchFamily="34" charset="0"/>
               </a:rPr>
-              <a:t>Chen, X., &amp; Caselden, D. (2013). New IE Zero-Day Found in Watering Hole Attack - Threat Research - FireEye Inc. Retrieved March 11, 2015, from </a:t>
-            </a:r>
+              <a:t>Baker, W. H., Hylender, C. D., &amp; Valentine, J. A. (2008). 2008 Data Breach Investigations Report, 1–29</a:t>
+            </a:r>
+            <a:r>
+              <a:rPr lang="en-AU" sz="1400" dirty="0" smtClean="0">
+                <a:solidFill>
+                  <a:srgbClr val="111111"/>
+                </a:solidFill>
+                <a:latin typeface="Open Sans" panose="020B0606030504020204" pitchFamily="34" charset="0"/>
+                <a:ea typeface="Open Sans" panose="020B0606030504020204" pitchFamily="34" charset="0"/>
+                <a:cs typeface="Open Sans" panose="020B0606030504020204" pitchFamily="34" charset="0"/>
+              </a:rPr>
+              <a:t>.</a:t>
+            </a:r>
+          </a:p>
+          <a:p>
+            <a:pPr marL="457200" indent="-457200" algn="l">
+              <a:lnSpc>
+                <a:spcPct val="100000"/>
+              </a:lnSpc>
+              <a:buFont typeface="Arial" panose="020B0604020202020204" pitchFamily="34" charset="0"/>
+              <a:buChar char="•"/>
+            </a:pPr>
             <a:r>
               <a:rPr lang="en-AU" sz="1400" dirty="0">
                 <a:solidFill>
@@ -9588,9 +9766,20 @@
                 <a:latin typeface="Open Sans" panose="020B0606030504020204" pitchFamily="34" charset="0"/>
                 <a:ea typeface="Open Sans" panose="020B0606030504020204" pitchFamily="34" charset="0"/>
                 <a:cs typeface="Open Sans" panose="020B0606030504020204" pitchFamily="34" charset="0"/>
+              </a:rPr>
+              <a:t>Goodin, D. (2014). Stanford’s password policy shuns one-size-fits-all security | Ars Technica. Ars Technica. Retrieved April 30, 2015, from </a:t>
+            </a:r>
+            <a:r>
+              <a:rPr lang="en-AU" sz="1400" dirty="0">
+                <a:solidFill>
+                  <a:srgbClr val="111111"/>
+                </a:solidFill>
+                <a:latin typeface="Open Sans" panose="020B0606030504020204" pitchFamily="34" charset="0"/>
+                <a:ea typeface="Open Sans" panose="020B0606030504020204" pitchFamily="34" charset="0"/>
+                <a:cs typeface="Open Sans" panose="020B0606030504020204" pitchFamily="34" charset="0"/>
                 <a:hlinkClick r:id="rId2"/>
               </a:rPr>
-              <a:t>https://</a:t>
+              <a:t>http://arstechnica.com/security/2014/04/25/stanfords-password-policy-shuns-one-size-fits-all-security</a:t>
             </a:r>
             <a:r>
               <a:rPr lang="en-AU" sz="1400" dirty="0" smtClean="0">
@@ -9602,7 +9791,7 @@
                 <a:cs typeface="Open Sans" panose="020B0606030504020204" pitchFamily="34" charset="0"/>
                 <a:hlinkClick r:id="rId2"/>
               </a:rPr>
-              <a:t>www.fireeye.com/blog/threat-research/2013/11/new-ie-zero-day-found-in-watering-hole-attack.html</a:t>
+              <a:t>/</a:t>
             </a:r>
             <a:endParaRPr lang="en-AU" sz="1400" dirty="0" smtClean="0">
               <a:solidFill>
@@ -9630,7 +9819,7 @@
                 <a:ea typeface="Open Sans" panose="020B0606030504020204" pitchFamily="34" charset="0"/>
                 <a:cs typeface="Open Sans" panose="020B0606030504020204" pitchFamily="34" charset="0"/>
               </a:rPr>
-              <a:t>Goodin, D. (2014). Stanford’s password policy shuns one-size-fits-all security | Ars Technica. Ars Technica. Retrieved April 30, 2015, from </a:t>
+              <a:t>Microsoft. (2005a). Apply or modify password policy: Logon and Authentication. Retrieved May 14, 2015, from </a:t>
             </a:r>
             <a:r>
               <a:rPr lang="en-AU" sz="1400" dirty="0">
@@ -9642,7 +9831,7 @@
                 <a:cs typeface="Open Sans" panose="020B0606030504020204" pitchFamily="34" charset="0"/>
                 <a:hlinkClick r:id="rId3"/>
               </a:rPr>
-              <a:t>http://arstechnica.com/security/2014/04/25/stanfords-password-policy-shuns-one-size-fits-all-security</a:t>
+              <a:t>https://technet.microsoft.com/en-au/library/cc781633(v=ws.10).aspx?f=255&amp;MSPPError=-</a:t>
             </a:r>
             <a:r>
               <a:rPr lang="en-AU" sz="1400" dirty="0" smtClean="0">
@@ -9654,90 +9843,7 @@
                 <a:cs typeface="Open Sans" panose="020B0606030504020204" pitchFamily="34" charset="0"/>
                 <a:hlinkClick r:id="rId3"/>
               </a:rPr>
-              <a:t>/</a:t>
-            </a:r>
-            <a:endParaRPr lang="en-AU" sz="1400" dirty="0">
-              <a:solidFill>
-                <a:srgbClr val="111111"/>
-              </a:solidFill>
-              <a:latin typeface="Open Sans" panose="020B0606030504020204" pitchFamily="34" charset="0"/>
-              <a:ea typeface="Open Sans" panose="020B0606030504020204" pitchFamily="34" charset="0"/>
-              <a:cs typeface="Open Sans" panose="020B0606030504020204" pitchFamily="34" charset="0"/>
-            </a:endParaRPr>
-          </a:p>
-          <a:p>
-            <a:pPr marL="457200" indent="-457200" algn="l">
-              <a:lnSpc>
-                <a:spcPct val="100000"/>
-              </a:lnSpc>
-              <a:buFont typeface="Arial" panose="020B0604020202020204" pitchFamily="34" charset="0"/>
-              <a:buChar char="•"/>
-            </a:pPr>
-            <a:r>
-              <a:rPr lang="en-AU" sz="1400" dirty="0">
-                <a:solidFill>
-                  <a:srgbClr val="111111"/>
-                </a:solidFill>
-                <a:latin typeface="Open Sans" panose="020B0606030504020204" pitchFamily="34" charset="0"/>
-                <a:ea typeface="Open Sans" panose="020B0606030504020204" pitchFamily="34" charset="0"/>
-                <a:cs typeface="Open Sans" panose="020B0606030504020204" pitchFamily="34" charset="0"/>
-              </a:rPr>
-              <a:t>Goodrich, M. T., &amp; Tamassia, R. (2011). Introduction to computer security. Boston: Pearson</a:t>
-            </a:r>
-            <a:r>
-              <a:rPr lang="en-AU" sz="1400" dirty="0" smtClean="0">
-                <a:solidFill>
-                  <a:srgbClr val="111111"/>
-                </a:solidFill>
-                <a:latin typeface="Open Sans" panose="020B0606030504020204" pitchFamily="34" charset="0"/>
-                <a:ea typeface="Open Sans" panose="020B0606030504020204" pitchFamily="34" charset="0"/>
-                <a:cs typeface="Open Sans" panose="020B0606030504020204" pitchFamily="34" charset="0"/>
-              </a:rPr>
-              <a:t>.</a:t>
-            </a:r>
-          </a:p>
-          <a:p>
-            <a:pPr marL="457200" indent="-457200" algn="l">
-              <a:lnSpc>
-                <a:spcPct val="100000"/>
-              </a:lnSpc>
-              <a:buFont typeface="Arial" panose="020B0604020202020204" pitchFamily="34" charset="0"/>
-              <a:buChar char="•"/>
-            </a:pPr>
-            <a:r>
-              <a:rPr lang="en-AU" sz="1400" dirty="0">
-                <a:solidFill>
-                  <a:srgbClr val="111111"/>
-                </a:solidFill>
-                <a:latin typeface="Open Sans" panose="020B0606030504020204" pitchFamily="34" charset="0"/>
-                <a:ea typeface="Open Sans" panose="020B0606030504020204" pitchFamily="34" charset="0"/>
-                <a:cs typeface="Open Sans" panose="020B0606030504020204" pitchFamily="34" charset="0"/>
-              </a:rPr>
-              <a:t>Microsoft. (2013). Microsoft Security Bulletin MS13-090 - Critical. Retrieved March 11, 2015, from </a:t>
-            </a:r>
-            <a:r>
-              <a:rPr lang="en-AU" sz="1400" dirty="0">
-                <a:solidFill>
-                  <a:srgbClr val="111111"/>
-                </a:solidFill>
-                <a:latin typeface="Open Sans" panose="020B0606030504020204" pitchFamily="34" charset="0"/>
-                <a:ea typeface="Open Sans" panose="020B0606030504020204" pitchFamily="34" charset="0"/>
-                <a:cs typeface="Open Sans" panose="020B0606030504020204" pitchFamily="34" charset="0"/>
-                <a:hlinkClick r:id="rId4"/>
-              </a:rPr>
-              <a:t>https://technet.microsoft.com/library/security/ms13-090?f=255&amp;MSPPError=-</a:t>
-            </a:r>
-            <a:r>
-              <a:rPr lang="en-AU" sz="1400" dirty="0" smtClean="0">
-                <a:solidFill>
-                  <a:srgbClr val="111111"/>
-                </a:solidFill>
-                <a:latin typeface="Open Sans" panose="020B0606030504020204" pitchFamily="34" charset="0"/>
-                <a:ea typeface="Open Sans" panose="020B0606030504020204" pitchFamily="34" charset="0"/>
-                <a:cs typeface="Open Sans" panose="020B0606030504020204" pitchFamily="34" charset="0"/>
-                <a:hlinkClick r:id="rId4"/>
-              </a:rPr>
-              <a:t>2147217396</a:t>
+              <a:t>2147217396#BKMK_3</a:t>
             </a:r>
             <a:endParaRPr lang="en-AU" sz="1400" dirty="0" smtClean="0">
               <a:solidFill>
@@ -9765,7 +9871,7 @@
                 <a:ea typeface="Open Sans" panose="020B0606030504020204" pitchFamily="34" charset="0"/>
                 <a:cs typeface="Open Sans" panose="020B0606030504020204" pitchFamily="34" charset="0"/>
               </a:rPr>
-              <a:t>Microsoft. (2014). Windows lifecycle fact sheet - Windows Help. Microsoft. Retrieved February 27, 2015, from </a:t>
+              <a:t>Microsoft. (2007). Configure UAC settings via policy - Microsoft Reduce Customer Effort Center - Site Home - TechNet Blogs. Retrieved May 14, 2015, from </a:t>
             </a:r>
             <a:r>
               <a:rPr lang="en-AU" sz="1400" dirty="0">
@@ -9775,7 +9881,7 @@
                 <a:latin typeface="Open Sans" panose="020B0606030504020204" pitchFamily="34" charset="0"/>
                 <a:ea typeface="Open Sans" panose="020B0606030504020204" pitchFamily="34" charset="0"/>
                 <a:cs typeface="Open Sans" panose="020B0606030504020204" pitchFamily="34" charset="0"/>
-                <a:hlinkClick r:id="rId5"/>
+                <a:hlinkClick r:id="rId4"/>
               </a:rPr>
               <a:t>http://</a:t>
             </a:r>
@@ -9787,9 +9893,9 @@
                 <a:latin typeface="Open Sans" panose="020B0606030504020204" pitchFamily="34" charset="0"/>
                 <a:ea typeface="Open Sans" panose="020B0606030504020204" pitchFamily="34" charset="0"/>
                 <a:cs typeface="Open Sans" panose="020B0606030504020204" pitchFamily="34" charset="0"/>
-                <a:hlinkClick r:id="rId5"/>
-              </a:rPr>
-              <a:t>windows.microsoft.com/en-au/windows/lifecycle</a:t>
+                <a:hlinkClick r:id="rId4"/>
+              </a:rPr>
+              <a:t>blogs.technet.com/b/asiasupp/archive/2007/02/08/configure-uac-settings-via-policy.aspx</a:t>
             </a:r>
             <a:endParaRPr lang="en-AU" sz="1400" dirty="0" smtClean="0">
               <a:solidFill>
@@ -9817,7 +9923,7 @@
                 <a:ea typeface="Open Sans" panose="020B0606030504020204" pitchFamily="34" charset="0"/>
                 <a:cs typeface="Open Sans" panose="020B0606030504020204" pitchFamily="34" charset="0"/>
               </a:rPr>
-              <a:t>Microsoft. (2015). Microsoft Support Lifecycle. Microsoft. Retrieved February 27, 2015, from </a:t>
+              <a:t>Microsoft. (n.d.-a). Screen Saver timeout. Retrieved May 14, 2015, from </a:t>
             </a:r>
             <a:r>
               <a:rPr lang="en-AU" sz="1400" dirty="0">
@@ -9827,9 +9933,9 @@
                 <a:latin typeface="Open Sans" panose="020B0606030504020204" pitchFamily="34" charset="0"/>
                 <a:ea typeface="Open Sans" panose="020B0606030504020204" pitchFamily="34" charset="0"/>
                 <a:cs typeface="Open Sans" panose="020B0606030504020204" pitchFamily="34" charset="0"/>
-                <a:hlinkClick r:id="rId6"/>
-              </a:rPr>
-              <a:t>http://</a:t>
+                <a:hlinkClick r:id="rId5"/>
+              </a:rPr>
+              <a:t>https://</a:t>
             </a:r>
             <a:r>
               <a:rPr lang="en-AU" sz="1400" dirty="0" smtClean="0">
@@ -9839,9 +9945,9 @@
                 <a:latin typeface="Open Sans" panose="020B0606030504020204" pitchFamily="34" charset="0"/>
                 <a:ea typeface="Open Sans" panose="020B0606030504020204" pitchFamily="34" charset="0"/>
                 <a:cs typeface="Open Sans" panose="020B0606030504020204" pitchFamily="34" charset="0"/>
-                <a:hlinkClick r:id="rId6"/>
-              </a:rPr>
-              <a:t>support.microsoft.com/lifecycle/search/default.aspx?alpha=Vista</a:t>
+                <a:hlinkClick r:id="rId5"/>
+              </a:rPr>
+              <a:t>technet.microsoft.com/en-us/library/cc961876.aspx</a:t>
             </a:r>
             <a:endParaRPr lang="en-AU" sz="1400" dirty="0" smtClean="0">
               <a:solidFill>
@@ -9869,7 +9975,7 @@
                 <a:ea typeface="Open Sans" panose="020B0606030504020204" pitchFamily="34" charset="0"/>
                 <a:cs typeface="Open Sans" panose="020B0606030504020204" pitchFamily="34" charset="0"/>
               </a:rPr>
-              <a:t>Microsoft. (n.d.-a). Internet Explorer system requirements IE11. Microsoft. Retrieved April 19, 2015, from </a:t>
+              <a:t>Microsoft. (n.d.-b). What is User Account Control? - Windows Help. Retrieved March 14, 2015, from </a:t>
             </a:r>
             <a:r>
               <a:rPr lang="en-AU" sz="1400" dirty="0">
@@ -9879,7 +9985,7 @@
                 <a:latin typeface="Open Sans" panose="020B0606030504020204" pitchFamily="34" charset="0"/>
                 <a:ea typeface="Open Sans" panose="020B0606030504020204" pitchFamily="34" charset="0"/>
                 <a:cs typeface="Open Sans" panose="020B0606030504020204" pitchFamily="34" charset="0"/>
-                <a:hlinkClick r:id="rId7"/>
+                <a:hlinkClick r:id="rId6"/>
               </a:rPr>
               <a:t>http://</a:t>
             </a:r>
@@ -9891,9 +9997,9 @@
                 <a:latin typeface="Open Sans" panose="020B0606030504020204" pitchFamily="34" charset="0"/>
                 <a:ea typeface="Open Sans" panose="020B0606030504020204" pitchFamily="34" charset="0"/>
                 <a:cs typeface="Open Sans" panose="020B0606030504020204" pitchFamily="34" charset="0"/>
-                <a:hlinkClick r:id="rId7"/>
-              </a:rPr>
-              <a:t>windows.microsoft.com/en-au/internet-explorer/ie-system-requirements#ie=ie-11</a:t>
+                <a:hlinkClick r:id="rId6"/>
+              </a:rPr>
+              <a:t>windows.microsoft.com/en-au/windows/what-is-user-account-control#1TC=windows-vista</a:t>
             </a:r>
             <a:endParaRPr lang="en-AU" sz="1400" dirty="0" smtClean="0">
               <a:solidFill>
@@ -9921,7 +10027,7 @@
                 <a:ea typeface="Open Sans" panose="020B0606030504020204" pitchFamily="34" charset="0"/>
                 <a:cs typeface="Open Sans" panose="020B0606030504020204" pitchFamily="34" charset="0"/>
               </a:rPr>
-              <a:t>Microsoft. (n.d.-b). What is User Account Control? - Windows Help. Retrieved March 14, 2015, from </a:t>
+              <a:t>Oliver, J., &amp; Snowden, E. [LastWeekTonight]. (2015, April 9). Last Week Tonight with John Oliver: Edward Snowden on Passwords. Retrieved May 6, 2015, from </a:t>
             </a:r>
             <a:r>
               <a:rPr lang="en-AU" sz="1400" dirty="0">
@@ -9931,9 +10037,9 @@
                 <a:latin typeface="Open Sans" panose="020B0606030504020204" pitchFamily="34" charset="0"/>
                 <a:ea typeface="Open Sans" panose="020B0606030504020204" pitchFamily="34" charset="0"/>
                 <a:cs typeface="Open Sans" panose="020B0606030504020204" pitchFamily="34" charset="0"/>
-                <a:hlinkClick r:id="rId8"/>
-              </a:rPr>
-              <a:t>http://</a:t>
+                <a:hlinkClick r:id="rId7"/>
+              </a:rPr>
+              <a:t>https://</a:t>
             </a:r>
             <a:r>
               <a:rPr lang="en-AU" sz="1400" dirty="0" smtClean="0">
@@ -9943,9 +10049,9 @@
                 <a:latin typeface="Open Sans" panose="020B0606030504020204" pitchFamily="34" charset="0"/>
                 <a:ea typeface="Open Sans" panose="020B0606030504020204" pitchFamily="34" charset="0"/>
                 <a:cs typeface="Open Sans" panose="020B0606030504020204" pitchFamily="34" charset="0"/>
-                <a:hlinkClick r:id="rId8"/>
-              </a:rPr>
-              <a:t>windows.microsoft.com/en-au/windows/what-is-user-account-control#1TC=windows-vista</a:t>
+                <a:hlinkClick r:id="rId7"/>
+              </a:rPr>
+              <a:t>www.youtube.com/watch?v=yzGzB-yYKcc</a:t>
             </a:r>
             <a:endParaRPr lang="en-AU" sz="1400" dirty="0" smtClean="0">
               <a:solidFill>
@@ -9973,8 +10079,28 @@
                 <a:ea typeface="Open Sans" panose="020B0606030504020204" pitchFamily="34" charset="0"/>
                 <a:cs typeface="Open Sans" panose="020B0606030504020204" pitchFamily="34" charset="0"/>
               </a:rPr>
-              <a:t>MITRE. (2006). CVE - CVE-2006-2198. cve.mitre.org. Retrieved March 11, 2015, from </a:t>
-            </a:r>
+              <a:t>Scarfone, K., &amp; Souppaya, M. (2013). Guide to Enterprise Patch Management Technologies NIST Special Publication 800-40 Guide to Enterprise Patch Management Technologies. NIST. </a:t>
+            </a:r>
+            <a:r>
+              <a:rPr lang="en-AU" sz="1400" dirty="0" smtClean="0">
+                <a:solidFill>
+                  <a:srgbClr val="111111"/>
+                </a:solidFill>
+                <a:latin typeface="Open Sans" panose="020B0606030504020204" pitchFamily="34" charset="0"/>
+                <a:ea typeface="Open Sans" panose="020B0606030504020204" pitchFamily="34" charset="0"/>
+                <a:cs typeface="Open Sans" panose="020B0606030504020204" pitchFamily="34" charset="0"/>
+              </a:rPr>
+              <a:t>doi:10.6028/NIST.SP.800-40r3</a:t>
+            </a:r>
+          </a:p>
+          <a:p>
+            <a:pPr marL="457200" indent="-457200" algn="l">
+              <a:lnSpc>
+                <a:spcPct val="100000"/>
+              </a:lnSpc>
+              <a:buFont typeface="Arial" panose="020B0604020202020204" pitchFamily="34" charset="0"/>
+              <a:buChar char="•"/>
+            </a:pPr>
             <a:r>
               <a:rPr lang="en-AU" sz="1400" dirty="0">
                 <a:solidFill>
@@ -9983,9 +10109,20 @@
                 <a:latin typeface="Open Sans" panose="020B0606030504020204" pitchFamily="34" charset="0"/>
                 <a:ea typeface="Open Sans" panose="020B0606030504020204" pitchFamily="34" charset="0"/>
                 <a:cs typeface="Open Sans" panose="020B0606030504020204" pitchFamily="34" charset="0"/>
-                <a:hlinkClick r:id="rId9"/>
-              </a:rPr>
-              <a:t>http://</a:t>
+              </a:rPr>
+              <a:t>Tice, K. [solarwindsinc]. (2012, September 12)  Patch Manager Guided Tour. Retrieved May 14, 2015, from </a:t>
+            </a:r>
+            <a:r>
+              <a:rPr lang="en-AU" sz="1400" dirty="0">
+                <a:solidFill>
+                  <a:srgbClr val="111111"/>
+                </a:solidFill>
+                <a:latin typeface="Open Sans" panose="020B0606030504020204" pitchFamily="34" charset="0"/>
+                <a:ea typeface="Open Sans" panose="020B0606030504020204" pitchFamily="34" charset="0"/>
+                <a:cs typeface="Open Sans" panose="020B0606030504020204" pitchFamily="34" charset="0"/>
+                <a:hlinkClick r:id="rId8"/>
+              </a:rPr>
+              <a:t>https://www.youtube.com/watch?v=-</a:t>
             </a:r>
             <a:r>
               <a:rPr lang="en-AU" sz="1400" dirty="0" smtClean="0">
@@ -9995,9 +10132,9 @@
                 <a:latin typeface="Open Sans" panose="020B0606030504020204" pitchFamily="34" charset="0"/>
                 <a:ea typeface="Open Sans" panose="020B0606030504020204" pitchFamily="34" charset="0"/>
                 <a:cs typeface="Open Sans" panose="020B0606030504020204" pitchFamily="34" charset="0"/>
-                <a:hlinkClick r:id="rId9"/>
-              </a:rPr>
-              <a:t>cve.mitre.org/cgi-bin/cvename.cgi?name=CVE-2006-2198</a:t>
+                <a:hlinkClick r:id="rId8"/>
+              </a:rPr>
+              <a:t>DldViUL1d0</a:t>
             </a:r>
             <a:endParaRPr lang="en-AU" sz="1400" dirty="0" smtClean="0">
               <a:solidFill>
@@ -10016,93 +10153,6 @@
               <a:buFont typeface="Arial" panose="020B0604020202020204" pitchFamily="34" charset="0"/>
               <a:buChar char="•"/>
             </a:pPr>
-            <a:r>
-              <a:rPr lang="en-AU" sz="1400" dirty="0">
-                <a:solidFill>
-                  <a:srgbClr val="111111"/>
-                </a:solidFill>
-                <a:latin typeface="Open Sans" panose="020B0606030504020204" pitchFamily="34" charset="0"/>
-                <a:ea typeface="Open Sans" panose="020B0606030504020204" pitchFamily="34" charset="0"/>
-                <a:cs typeface="Open Sans" panose="020B0606030504020204" pitchFamily="34" charset="0"/>
-              </a:rPr>
-              <a:t>MITRE. (2014). CVE - CVE-2014-1532. cve.mitre.org. Retrieved March 18, 2015, from </a:t>
-            </a:r>
-            <a:r>
-              <a:rPr lang="en-AU" sz="1400" dirty="0">
-                <a:solidFill>
-                  <a:srgbClr val="111111"/>
-                </a:solidFill>
-                <a:latin typeface="Open Sans" panose="020B0606030504020204" pitchFamily="34" charset="0"/>
-                <a:ea typeface="Open Sans" panose="020B0606030504020204" pitchFamily="34" charset="0"/>
-                <a:cs typeface="Open Sans" panose="020B0606030504020204" pitchFamily="34" charset="0"/>
-                <a:hlinkClick r:id="rId10"/>
-              </a:rPr>
-              <a:t>http://</a:t>
-            </a:r>
-            <a:r>
-              <a:rPr lang="en-AU" sz="1400" dirty="0" smtClean="0">
-                <a:solidFill>
-                  <a:srgbClr val="111111"/>
-                </a:solidFill>
-                <a:latin typeface="Open Sans" panose="020B0606030504020204" pitchFamily="34" charset="0"/>
-                <a:ea typeface="Open Sans" panose="020B0606030504020204" pitchFamily="34" charset="0"/>
-                <a:cs typeface="Open Sans" panose="020B0606030504020204" pitchFamily="34" charset="0"/>
-                <a:hlinkClick r:id="rId10"/>
-              </a:rPr>
-              <a:t>cve.mitre.org/cgi-bin/cvename.cgi?name=CVE-2014-1532</a:t>
-            </a:r>
-            <a:endParaRPr lang="en-AU" sz="1400" dirty="0" smtClean="0">
-              <a:solidFill>
-                <a:srgbClr val="111111"/>
-              </a:solidFill>
-              <a:latin typeface="Open Sans" panose="020B0606030504020204" pitchFamily="34" charset="0"/>
-              <a:ea typeface="Open Sans" panose="020B0606030504020204" pitchFamily="34" charset="0"/>
-              <a:cs typeface="Open Sans" panose="020B0606030504020204" pitchFamily="34" charset="0"/>
-            </a:endParaRPr>
-          </a:p>
-          <a:p>
-            <a:pPr marL="457200" indent="-457200" algn="l">
-              <a:lnSpc>
-                <a:spcPct val="100000"/>
-              </a:lnSpc>
-              <a:buFont typeface="Arial" panose="020B0604020202020204" pitchFamily="34" charset="0"/>
-              <a:buChar char="•"/>
-            </a:pPr>
-            <a:r>
-              <a:rPr lang="en-AU" sz="1400" dirty="0">
-                <a:solidFill>
-                  <a:srgbClr val="111111"/>
-                </a:solidFill>
-                <a:latin typeface="Open Sans" panose="020B0606030504020204" pitchFamily="34" charset="0"/>
-                <a:ea typeface="Open Sans" panose="020B0606030504020204" pitchFamily="34" charset="0"/>
-                <a:cs typeface="Open Sans" panose="020B0606030504020204" pitchFamily="34" charset="0"/>
-              </a:rPr>
-              <a:t>Moran, N., Scott, M., Vashisht, S. O., &amp; Haq, T. (2013). Operation Ephemeral Hydra: IE Zero-Day Linked to DeputyDog Uses Diskless Method | Threat Research | FireEye Inc. Retrieved March 11, 2015, from </a:t>
-            </a:r>
-            <a:r>
-              <a:rPr lang="en-AU" sz="1400" dirty="0">
-                <a:solidFill>
-                  <a:srgbClr val="111111"/>
-                </a:solidFill>
-                <a:latin typeface="Open Sans" panose="020B0606030504020204" pitchFamily="34" charset="0"/>
-                <a:ea typeface="Open Sans" panose="020B0606030504020204" pitchFamily="34" charset="0"/>
-                <a:cs typeface="Open Sans" panose="020B0606030504020204" pitchFamily="34" charset="0"/>
-                <a:hlinkClick r:id="rId11"/>
-              </a:rPr>
-              <a:t>https://</a:t>
-            </a:r>
-            <a:r>
-              <a:rPr lang="en-AU" sz="1400" dirty="0" smtClean="0">
-                <a:solidFill>
-                  <a:srgbClr val="111111"/>
-                </a:solidFill>
-                <a:latin typeface="Open Sans" panose="020B0606030504020204" pitchFamily="34" charset="0"/>
-                <a:ea typeface="Open Sans" panose="020B0606030504020204" pitchFamily="34" charset="0"/>
-                <a:cs typeface="Open Sans" panose="020B0606030504020204" pitchFamily="34" charset="0"/>
-                <a:hlinkClick r:id="rId11"/>
-              </a:rPr>
-              <a:t>www.fireeye.com/blog/threat-research/2013/11/operation-ephemeral-hydra-ie-zero-day-linked-to-deputydog-uses-diskless-method.html</a:t>
-            </a:r>
             <a:endParaRPr lang="en-AU" sz="1400" dirty="0" smtClean="0">
               <a:solidFill>
                 <a:srgbClr val="111111"/>
@@ -10391,14 +10441,6 @@
               </a:rPr>
               <a:t>Anti-virus and network security</a:t>
             </a:r>
-            <a:endParaRPr lang="en-AU" sz="2800" dirty="0" smtClean="0">
-              <a:solidFill>
-                <a:srgbClr val="111111"/>
-              </a:solidFill>
-              <a:latin typeface="Open Sans" panose="020B0606030504020204" pitchFamily="34" charset="0"/>
-              <a:ea typeface="Open Sans" panose="020B0606030504020204" pitchFamily="34" charset="0"/>
-              <a:cs typeface="Open Sans" panose="020B0606030504020204" pitchFamily="34" charset="0"/>
-            </a:endParaRPr>
           </a:p>
         </p:txBody>
       </p:sp>
@@ -10706,7 +10748,29 @@
                 <a:ea typeface="Open Sans" panose="020B0606030504020204" pitchFamily="34" charset="0"/>
                 <a:cs typeface="Open Sans" panose="020B0606030504020204" pitchFamily="34" charset="0"/>
               </a:rPr>
-              <a:t>Vendors generally provides patches for customers to install in order to mitigate such vulnerabilities</a:t>
+              <a:t>Vendors generally </a:t>
+            </a:r>
+            <a:r>
+              <a:rPr lang="en-AU" sz="2600" dirty="0" smtClean="0">
+                <a:solidFill>
+                  <a:srgbClr val="111111"/>
+                </a:solidFill>
+                <a:latin typeface="Open Sans" panose="020B0606030504020204" pitchFamily="34" charset="0"/>
+                <a:ea typeface="Open Sans" panose="020B0606030504020204" pitchFamily="34" charset="0"/>
+                <a:cs typeface="Open Sans" panose="020B0606030504020204" pitchFamily="34" charset="0"/>
+              </a:rPr>
+              <a:t>provide </a:t>
+            </a:r>
+            <a:r>
+              <a:rPr lang="en-AU" sz="2600" dirty="0" smtClean="0">
+                <a:solidFill>
+                  <a:srgbClr val="111111"/>
+                </a:solidFill>
+                <a:latin typeface="Open Sans" panose="020B0606030504020204" pitchFamily="34" charset="0"/>
+                <a:ea typeface="Open Sans" panose="020B0606030504020204" pitchFamily="34" charset="0"/>
+                <a:cs typeface="Open Sans" panose="020B0606030504020204" pitchFamily="34" charset="0"/>
+              </a:rPr>
+              <a:t>patches for customers to install in order to mitigate such vulnerabilities</a:t>
             </a:r>
           </a:p>
           <a:p>

</xml_diff>

<commit_message>
CSI1101 A2: fixed wording 'mitigate'
</commit_message>
<xml_diff>
--- a/year_1/sem_2/CSI1101_computer_security/0b_assignment_2_[22MAY15_0900]/dev/CSI1101_PONCE_A2_v02.pptx
+++ b/year_1/sem_2/CSI1101_computer_security/0b_assignment_2_[22MAY15_0900]/dev/CSI1101_PONCE_A2_v02.pptx
@@ -47,16 +47,16 @@
   <p:notesSz cx="6858000" cy="9144000"/>
   <p:embeddedFontLst>
     <p:embeddedFont>
-      <p:font typeface="Calibri Light" panose="020F0302020204030204" pitchFamily="34" charset="0"/>
+      <p:font typeface="Open Sans" panose="020B0606030504020204" pitchFamily="34" charset="0"/>
       <p:regular r:id="rId39"/>
-      <p:italic r:id="rId40"/>
+      <p:bold r:id="rId40"/>
+      <p:italic r:id="rId41"/>
+      <p:boldItalic r:id="rId42"/>
     </p:embeddedFont>
     <p:embeddedFont>
-      <p:font typeface="Open Sans" panose="020B0606030504020204" pitchFamily="34" charset="0"/>
-      <p:regular r:id="rId41"/>
-      <p:bold r:id="rId42"/>
-      <p:italic r:id="rId43"/>
-      <p:boldItalic r:id="rId44"/>
+      <p:font typeface="Calibri Light" panose="020F0302020204030204" pitchFamily="34" charset="0"/>
+      <p:regular r:id="rId43"/>
+      <p:italic r:id="rId44"/>
     </p:embeddedFont>
     <p:embeddedFont>
       <p:font typeface="Calibri" panose="020F0502020204030204" pitchFamily="34" charset="0"/>
@@ -4438,19 +4438,7 @@
                 <a:cs typeface="Open Sans" panose="020B0606030504020204" pitchFamily="34" charset="0"/>
                 <a:hlinkClick r:id="rId4"/>
               </a:rPr>
-              <a:t>n.d</a:t>
-            </a:r>
-            <a:r>
-              <a:rPr lang="en-AU" sz="2600" dirty="0" err="1" smtClean="0">
-                <a:solidFill>
-                  <a:srgbClr val="111111"/>
-                </a:solidFill>
-                <a:latin typeface="Open Sans" panose="020B0606030504020204" pitchFamily="34" charset="0"/>
-                <a:ea typeface="Open Sans" panose="020B0606030504020204" pitchFamily="34" charset="0"/>
-                <a:cs typeface="Open Sans" panose="020B0606030504020204" pitchFamily="34" charset="0"/>
-                <a:hlinkClick r:id="rId4"/>
-              </a:rPr>
-              <a:t>.</a:t>
+              <a:t>n.d.</a:t>
             </a:r>
             <a:r>
               <a:rPr lang="en-AU" sz="2600" dirty="0" smtClean="0">
@@ -4612,18 +4600,7 @@
                 <a:ea typeface="Open Sans" panose="020B0606030504020204" pitchFamily="34" charset="0"/>
                 <a:cs typeface="Open Sans" panose="020B0606030504020204" pitchFamily="34" charset="0"/>
               </a:rPr>
-              <a:t>Enforce </a:t>
-            </a:r>
-            <a:r>
-              <a:rPr lang="en-AU" sz="2600" dirty="0" smtClean="0">
-                <a:solidFill>
-                  <a:srgbClr val="111111"/>
-                </a:solidFill>
-                <a:latin typeface="Open Sans" panose="020B0606030504020204" pitchFamily="34" charset="0"/>
-                <a:ea typeface="Open Sans" panose="020B0606030504020204" pitchFamily="34" charset="0"/>
-                <a:cs typeface="Open Sans" panose="020B0606030504020204" pitchFamily="34" charset="0"/>
-              </a:rPr>
-              <a:t>password policy</a:t>
+              <a:t>Enforce password policy</a:t>
             </a:r>
           </a:p>
           <a:p>
@@ -4640,18 +4617,7 @@
                 <a:ea typeface="Open Sans" panose="020B0606030504020204" pitchFamily="34" charset="0"/>
                 <a:cs typeface="Open Sans" panose="020B0606030504020204" pitchFamily="34" charset="0"/>
               </a:rPr>
-              <a:t>Assign </a:t>
-            </a:r>
-            <a:r>
-              <a:rPr lang="en-AU" sz="2600" dirty="0" smtClean="0">
-                <a:solidFill>
-                  <a:srgbClr val="111111"/>
-                </a:solidFill>
-                <a:latin typeface="Open Sans" panose="020B0606030504020204" pitchFamily="34" charset="0"/>
-                <a:ea typeface="Open Sans" panose="020B0606030504020204" pitchFamily="34" charset="0"/>
-                <a:cs typeface="Open Sans" panose="020B0606030504020204" pitchFamily="34" charset="0"/>
-              </a:rPr>
-              <a:t>and enforce security policies for users and computers</a:t>
+              <a:t>Assign and enforce security policies for users and computers</a:t>
             </a:r>
           </a:p>
           <a:p>
@@ -4702,18 +4668,7 @@
                 <a:ea typeface="Open Sans" panose="020B0606030504020204" pitchFamily="34" charset="0"/>
                 <a:cs typeface="Open Sans" panose="020B0606030504020204" pitchFamily="34" charset="0"/>
               </a:rPr>
-              <a:t>Mitigate </a:t>
-            </a:r>
-            <a:r>
-              <a:rPr lang="en-AU" sz="2600" dirty="0" smtClean="0">
-                <a:solidFill>
-                  <a:srgbClr val="111111"/>
-                </a:solidFill>
-                <a:latin typeface="Open Sans" panose="020B0606030504020204" pitchFamily="34" charset="0"/>
-                <a:ea typeface="Open Sans" panose="020B0606030504020204" pitchFamily="34" charset="0"/>
-                <a:cs typeface="Open Sans" panose="020B0606030504020204" pitchFamily="34" charset="0"/>
-              </a:rPr>
-              <a:t>brute-force attacks</a:t>
+              <a:t>Mitigate brute-force attacks</a:t>
             </a:r>
           </a:p>
         </p:txBody>
@@ -5416,18 +5371,7 @@
                 <a:ea typeface="Open Sans" panose="020B0606030504020204" pitchFamily="34" charset="0"/>
                 <a:cs typeface="Open Sans" panose="020B0606030504020204" pitchFamily="34" charset="0"/>
               </a:rPr>
-              <a:t>Minimize </a:t>
-            </a:r>
-            <a:r>
-              <a:rPr lang="en-AU" sz="2600" dirty="0" smtClean="0">
-                <a:solidFill>
-                  <a:srgbClr val="111111"/>
-                </a:solidFill>
-                <a:latin typeface="Open Sans" panose="020B0606030504020204" pitchFamily="34" charset="0"/>
-                <a:ea typeface="Open Sans" panose="020B0606030504020204" pitchFamily="34" charset="0"/>
-                <a:cs typeface="Open Sans" panose="020B0606030504020204" pitchFamily="34" charset="0"/>
-              </a:rPr>
-              <a:t>risk that a user will write password down on paper or save in plaintext</a:t>
+              <a:t>Minimize risk that a user will write password down on paper or save in plaintext</a:t>
             </a:r>
             <a:endParaRPr lang="en-AU" sz="2600" dirty="0">
               <a:solidFill>
@@ -6866,18 +6810,7 @@
                 <a:ea typeface="Open Sans" panose="020B0606030504020204" pitchFamily="34" charset="0"/>
                 <a:cs typeface="Open Sans" panose="020B0606030504020204" pitchFamily="34" charset="0"/>
               </a:rPr>
-              <a:t>Mitigate </a:t>
-            </a:r>
-            <a:r>
-              <a:rPr lang="en-AU" sz="2600" dirty="0" smtClean="0">
-                <a:solidFill>
-                  <a:srgbClr val="111111"/>
-                </a:solidFill>
-                <a:latin typeface="Open Sans" panose="020B0606030504020204" pitchFamily="34" charset="0"/>
-                <a:ea typeface="Open Sans" panose="020B0606030504020204" pitchFamily="34" charset="0"/>
-                <a:cs typeface="Open Sans" panose="020B0606030504020204" pitchFamily="34" charset="0"/>
-              </a:rPr>
-              <a:t>possible changes made by malware</a:t>
+              <a:t>Mitigate possible changes made by malware</a:t>
             </a:r>
           </a:p>
           <a:p>
@@ -6911,18 +6844,7 @@
                 <a:ea typeface="Open Sans" panose="020B0606030504020204" pitchFamily="34" charset="0"/>
                 <a:cs typeface="Open Sans" panose="020B0606030504020204" pitchFamily="34" charset="0"/>
               </a:rPr>
-              <a:t>Mitigate </a:t>
-            </a:r>
-            <a:r>
-              <a:rPr lang="en-AU" sz="2600" dirty="0" smtClean="0">
-                <a:solidFill>
-                  <a:srgbClr val="111111"/>
-                </a:solidFill>
-                <a:latin typeface="Open Sans" panose="020B0606030504020204" pitchFamily="34" charset="0"/>
-                <a:ea typeface="Open Sans" panose="020B0606030504020204" pitchFamily="34" charset="0"/>
-                <a:cs typeface="Open Sans" panose="020B0606030504020204" pitchFamily="34" charset="0"/>
-              </a:rPr>
-              <a:t>possible malware propagation</a:t>
+              <a:t>Mitigate possible malware propagation</a:t>
             </a:r>
           </a:p>
           <a:p>
@@ -7369,18 +7291,7 @@
                 <a:ea typeface="Open Sans" panose="020B0606030504020204" pitchFamily="34" charset="0"/>
                 <a:cs typeface="Open Sans" panose="020B0606030504020204" pitchFamily="34" charset="0"/>
               </a:rPr>
-              <a:t>Mitigate possible changes </a:t>
-            </a:r>
-            <a:r>
-              <a:rPr lang="en-AU" sz="2600" dirty="0" smtClean="0">
-                <a:solidFill>
-                  <a:srgbClr val="111111"/>
-                </a:solidFill>
-                <a:latin typeface="Open Sans" panose="020B0606030504020204" pitchFamily="34" charset="0"/>
-                <a:ea typeface="Open Sans" panose="020B0606030504020204" pitchFamily="34" charset="0"/>
-                <a:cs typeface="Open Sans" panose="020B0606030504020204" pitchFamily="34" charset="0"/>
-              </a:rPr>
-              <a:t>made by malware</a:t>
+              <a:t>Mitigate possible changes made by malware</a:t>
             </a:r>
           </a:p>
           <a:p>
@@ -7397,18 +7308,7 @@
                 <a:ea typeface="Open Sans" panose="020B0606030504020204" pitchFamily="34" charset="0"/>
                 <a:cs typeface="Open Sans" panose="020B0606030504020204" pitchFamily="34" charset="0"/>
               </a:rPr>
-              <a:t>Mitigate </a:t>
-            </a:r>
-            <a:r>
-              <a:rPr lang="en-AU" sz="2600" dirty="0" smtClean="0">
-                <a:solidFill>
-                  <a:srgbClr val="111111"/>
-                </a:solidFill>
-                <a:latin typeface="Open Sans" panose="020B0606030504020204" pitchFamily="34" charset="0"/>
-                <a:ea typeface="Open Sans" panose="020B0606030504020204" pitchFamily="34" charset="0"/>
-                <a:cs typeface="Open Sans" panose="020B0606030504020204" pitchFamily="34" charset="0"/>
-              </a:rPr>
-              <a:t>possible malware propagation</a:t>
+              <a:t>Mitigate possible malware propagation</a:t>
             </a:r>
           </a:p>
         </p:txBody>
@@ -7732,27 +7632,8 @@
                 <a:ea typeface="Open Sans" panose="020B0606030504020204" pitchFamily="34" charset="0"/>
                 <a:cs typeface="Open Sans" panose="020B0606030504020204" pitchFamily="34" charset="0"/>
               </a:rPr>
-              <a:t>Blue Ink has at least one Windows based server capable of </a:t>
-            </a:r>
-            <a:r>
-              <a:rPr lang="en-AU" sz="2800" dirty="0" smtClean="0">
-                <a:solidFill>
-                  <a:srgbClr val="111111"/>
-                </a:solidFill>
-                <a:latin typeface="Open Sans" panose="020B0606030504020204" pitchFamily="34" charset="0"/>
-                <a:ea typeface="Open Sans" panose="020B0606030504020204" pitchFamily="34" charset="0"/>
-                <a:cs typeface="Open Sans" panose="020B0606030504020204" pitchFamily="34" charset="0"/>
-              </a:rPr>
-              <a:t>Active Directory</a:t>
-            </a:r>
-            <a:endParaRPr lang="en-AU" sz="2800" dirty="0" smtClean="0">
-              <a:solidFill>
-                <a:srgbClr val="111111"/>
-              </a:solidFill>
-              <a:latin typeface="Open Sans" panose="020B0606030504020204" pitchFamily="34" charset="0"/>
-              <a:ea typeface="Open Sans" panose="020B0606030504020204" pitchFamily="34" charset="0"/>
-              <a:cs typeface="Open Sans" panose="020B0606030504020204" pitchFamily="34" charset="0"/>
-            </a:endParaRPr>
+              <a:t>Blue Ink has at least one Windows based server capable of Active Directory</a:t>
+            </a:r>
           </a:p>
           <a:p>
             <a:pPr marL="457200" indent="-457200" algn="l">
@@ -10748,29 +10629,7 @@
                 <a:ea typeface="Open Sans" panose="020B0606030504020204" pitchFamily="34" charset="0"/>
                 <a:cs typeface="Open Sans" panose="020B0606030504020204" pitchFamily="34" charset="0"/>
               </a:rPr>
-              <a:t>Vendors generally </a:t>
-            </a:r>
-            <a:r>
-              <a:rPr lang="en-AU" sz="2600" dirty="0" smtClean="0">
-                <a:solidFill>
-                  <a:srgbClr val="111111"/>
-                </a:solidFill>
-                <a:latin typeface="Open Sans" panose="020B0606030504020204" pitchFamily="34" charset="0"/>
-                <a:ea typeface="Open Sans" panose="020B0606030504020204" pitchFamily="34" charset="0"/>
-                <a:cs typeface="Open Sans" panose="020B0606030504020204" pitchFamily="34" charset="0"/>
-              </a:rPr>
-              <a:t>provide </a:t>
-            </a:r>
-            <a:r>
-              <a:rPr lang="en-AU" sz="2600" dirty="0" smtClean="0">
-                <a:solidFill>
-                  <a:srgbClr val="111111"/>
-                </a:solidFill>
-                <a:latin typeface="Open Sans" panose="020B0606030504020204" pitchFamily="34" charset="0"/>
-                <a:ea typeface="Open Sans" panose="020B0606030504020204" pitchFamily="34" charset="0"/>
-                <a:cs typeface="Open Sans" panose="020B0606030504020204" pitchFamily="34" charset="0"/>
-              </a:rPr>
-              <a:t>patches for customers to install in order to mitigate such vulnerabilities</a:t>
+              <a:t>Vendors generally provide patches for customers to install in order to mitigate such vulnerabilities</a:t>
             </a:r>
           </a:p>
           <a:p>

</xml_diff>

<commit_message>
CSI1101 A2: fixed bib, fixed plural verbs
</commit_message>
<xml_diff>
--- a/year_1/sem_2/CSI1101_computer_security/0b_assignment_2_[22MAY15_0900]/dev/CSI1101_PONCE_A2_v02.pptx
+++ b/year_1/sem_2/CSI1101_computer_security/0b_assignment_2_[22MAY15_0900]/dev/CSI1101_PONCE_A2_v02.pptx
@@ -47,23 +47,23 @@
   <p:notesSz cx="6858000" cy="9144000"/>
   <p:embeddedFontLst>
     <p:embeddedFont>
-      <p:font typeface="Open Sans" panose="020B0606030504020204" pitchFamily="34" charset="0"/>
+      <p:font typeface="Calibri" panose="020F0502020204030204" pitchFamily="34" charset="0"/>
       <p:regular r:id="rId39"/>
       <p:bold r:id="rId40"/>
       <p:italic r:id="rId41"/>
       <p:boldItalic r:id="rId42"/>
     </p:embeddedFont>
     <p:embeddedFont>
-      <p:font typeface="Calibri Light" panose="020F0302020204030204" pitchFamily="34" charset="0"/>
+      <p:font typeface="Open Sans" panose="020B0606030504020204" pitchFamily="34" charset="0"/>
       <p:regular r:id="rId43"/>
-      <p:italic r:id="rId44"/>
+      <p:bold r:id="rId44"/>
+      <p:italic r:id="rId45"/>
+      <p:boldItalic r:id="rId46"/>
     </p:embeddedFont>
     <p:embeddedFont>
-      <p:font typeface="Calibri" panose="020F0502020204030204" pitchFamily="34" charset="0"/>
-      <p:regular r:id="rId45"/>
-      <p:bold r:id="rId46"/>
-      <p:italic r:id="rId47"/>
-      <p:boldItalic r:id="rId48"/>
+      <p:font typeface="Calibri Light" panose="020F0302020204030204" pitchFamily="34" charset="0"/>
+      <p:regular r:id="rId47"/>
+      <p:italic r:id="rId48"/>
     </p:embeddedFont>
   </p:embeddedFontLst>
   <p:defaultTextStyle>
@@ -311,7 +311,7 @@
           <a:p>
             <a:fld id="{7B1A49F8-424C-43DF-ABBC-6BF9F0D68733}" type="datetimeFigureOut">
               <a:rPr lang="en-AU" smtClean="0"/>
-              <a:t>14/05/2015</a:t>
+              <a:t>15/05/2015</a:t>
             </a:fld>
             <a:endParaRPr lang="en-AU"/>
           </a:p>
@@ -481,7 +481,7 @@
           <a:p>
             <a:fld id="{7B1A49F8-424C-43DF-ABBC-6BF9F0D68733}" type="datetimeFigureOut">
               <a:rPr lang="en-AU" smtClean="0"/>
-              <a:t>14/05/2015</a:t>
+              <a:t>15/05/2015</a:t>
             </a:fld>
             <a:endParaRPr lang="en-AU"/>
           </a:p>
@@ -661,7 +661,7 @@
           <a:p>
             <a:fld id="{7B1A49F8-424C-43DF-ABBC-6BF9F0D68733}" type="datetimeFigureOut">
               <a:rPr lang="en-AU" smtClean="0"/>
-              <a:t>14/05/2015</a:t>
+              <a:t>15/05/2015</a:t>
             </a:fld>
             <a:endParaRPr lang="en-AU"/>
           </a:p>
@@ -831,7 +831,7 @@
           <a:p>
             <a:fld id="{7B1A49F8-424C-43DF-ABBC-6BF9F0D68733}" type="datetimeFigureOut">
               <a:rPr lang="en-AU" smtClean="0"/>
-              <a:t>14/05/2015</a:t>
+              <a:t>15/05/2015</a:t>
             </a:fld>
             <a:endParaRPr lang="en-AU"/>
           </a:p>
@@ -1077,7 +1077,7 @@
           <a:p>
             <a:fld id="{7B1A49F8-424C-43DF-ABBC-6BF9F0D68733}" type="datetimeFigureOut">
               <a:rPr lang="en-AU" smtClean="0"/>
-              <a:t>14/05/2015</a:t>
+              <a:t>15/05/2015</a:t>
             </a:fld>
             <a:endParaRPr lang="en-AU"/>
           </a:p>
@@ -1309,7 +1309,7 @@
           <a:p>
             <a:fld id="{7B1A49F8-424C-43DF-ABBC-6BF9F0D68733}" type="datetimeFigureOut">
               <a:rPr lang="en-AU" smtClean="0"/>
-              <a:t>14/05/2015</a:t>
+              <a:t>15/05/2015</a:t>
             </a:fld>
             <a:endParaRPr lang="en-AU"/>
           </a:p>
@@ -1676,7 +1676,7 @@
           <a:p>
             <a:fld id="{7B1A49F8-424C-43DF-ABBC-6BF9F0D68733}" type="datetimeFigureOut">
               <a:rPr lang="en-AU" smtClean="0"/>
-              <a:t>14/05/2015</a:t>
+              <a:t>15/05/2015</a:t>
             </a:fld>
             <a:endParaRPr lang="en-AU"/>
           </a:p>
@@ -1794,7 +1794,7 @@
           <a:p>
             <a:fld id="{7B1A49F8-424C-43DF-ABBC-6BF9F0D68733}" type="datetimeFigureOut">
               <a:rPr lang="en-AU" smtClean="0"/>
-              <a:t>14/05/2015</a:t>
+              <a:t>15/05/2015</a:t>
             </a:fld>
             <a:endParaRPr lang="en-AU"/>
           </a:p>
@@ -1889,7 +1889,7 @@
           <a:p>
             <a:fld id="{7B1A49F8-424C-43DF-ABBC-6BF9F0D68733}" type="datetimeFigureOut">
               <a:rPr lang="en-AU" smtClean="0"/>
-              <a:t>14/05/2015</a:t>
+              <a:t>15/05/2015</a:t>
             </a:fld>
             <a:endParaRPr lang="en-AU"/>
           </a:p>
@@ -2166,7 +2166,7 @@
           <a:p>
             <a:fld id="{7B1A49F8-424C-43DF-ABBC-6BF9F0D68733}" type="datetimeFigureOut">
               <a:rPr lang="en-AU" smtClean="0"/>
-              <a:t>14/05/2015</a:t>
+              <a:t>15/05/2015</a:t>
             </a:fld>
             <a:endParaRPr lang="en-AU"/>
           </a:p>
@@ -2419,7 +2419,7 @@
           <a:p>
             <a:fld id="{7B1A49F8-424C-43DF-ABBC-6BF9F0D68733}" type="datetimeFigureOut">
               <a:rPr lang="en-AU" smtClean="0"/>
-              <a:t>14/05/2015</a:t>
+              <a:t>15/05/2015</a:t>
             </a:fld>
             <a:endParaRPr lang="en-AU"/>
           </a:p>
@@ -2632,7 +2632,7 @@
           <a:p>
             <a:fld id="{7B1A49F8-424C-43DF-ABBC-6BF9F0D68733}" type="datetimeFigureOut">
               <a:rPr lang="en-AU" smtClean="0"/>
-              <a:t>14/05/2015</a:t>
+              <a:t>15/05/2015</a:t>
             </a:fld>
             <a:endParaRPr lang="en-AU"/>
           </a:p>
@@ -3733,7 +3733,7 @@
         <p:spPr>
           <a:xfrm>
             <a:off x="1524000" y="2241731"/>
-            <a:ext cx="9144000" cy="3693319"/>
+            <a:ext cx="9144000" cy="3293209"/>
           </a:xfrm>
           <a:prstGeom prst="rect">
             <a:avLst/>
@@ -3866,7 +3866,18 @@
                 <a:ea typeface="Open Sans" panose="020B0606030504020204" pitchFamily="34" charset="0"/>
                 <a:cs typeface="Open Sans" panose="020B0606030504020204" pitchFamily="34" charset="0"/>
               </a:rPr>
-              <a:t>Minimizes the time between patch release and patch install</a:t>
+              <a:t>Minimize </a:t>
+            </a:r>
+            <a:r>
+              <a:rPr lang="en-AU" sz="2600" dirty="0" smtClean="0">
+                <a:solidFill>
+                  <a:srgbClr val="111111"/>
+                </a:solidFill>
+                <a:latin typeface="Open Sans" panose="020B0606030504020204" pitchFamily="34" charset="0"/>
+                <a:ea typeface="Open Sans" panose="020B0606030504020204" pitchFamily="34" charset="0"/>
+                <a:cs typeface="Open Sans" panose="020B0606030504020204" pitchFamily="34" charset="0"/>
+              </a:rPr>
+              <a:t>time between patch release and patch install</a:t>
             </a:r>
           </a:p>
           <a:p>
@@ -3883,7 +3894,18 @@
                 <a:ea typeface="Open Sans" panose="020B0606030504020204" pitchFamily="34" charset="0"/>
                 <a:cs typeface="Open Sans" panose="020B0606030504020204" pitchFamily="34" charset="0"/>
               </a:rPr>
-              <a:t>Minimizes window of opportunity for attack</a:t>
+              <a:t>Minimize </a:t>
+            </a:r>
+            <a:r>
+              <a:rPr lang="en-AU" sz="2600" dirty="0" smtClean="0">
+                <a:solidFill>
+                  <a:srgbClr val="111111"/>
+                </a:solidFill>
+                <a:latin typeface="Open Sans" panose="020B0606030504020204" pitchFamily="34" charset="0"/>
+                <a:ea typeface="Open Sans" panose="020B0606030504020204" pitchFamily="34" charset="0"/>
+                <a:cs typeface="Open Sans" panose="020B0606030504020204" pitchFamily="34" charset="0"/>
+              </a:rPr>
+              <a:t>window of opportunity for attack</a:t>
             </a:r>
           </a:p>
         </p:txBody>
@@ -4335,7 +4357,19 @@
                 <a:cs typeface="Open Sans" panose="020B0606030504020204" pitchFamily="34" charset="0"/>
                 <a:hlinkClick r:id="rId2"/>
               </a:rPr>
-              <a:t>(Microsoft, 2005)</a:t>
+              <a:t>(Microsoft, </a:t>
+            </a:r>
+            <a:r>
+              <a:rPr lang="en-AU" sz="2600" dirty="0" smtClean="0">
+                <a:solidFill>
+                  <a:srgbClr val="111111"/>
+                </a:solidFill>
+                <a:latin typeface="Open Sans" panose="020B0606030504020204" pitchFamily="34" charset="0"/>
+                <a:ea typeface="Open Sans" panose="020B0606030504020204" pitchFamily="34" charset="0"/>
+                <a:cs typeface="Open Sans" panose="020B0606030504020204" pitchFamily="34" charset="0"/>
+                <a:hlinkClick r:id="rId2"/>
+              </a:rPr>
+              <a:t>2005a)</a:t>
             </a:r>
             <a:endParaRPr lang="en-AU" sz="2600" dirty="0" smtClean="0">
               <a:solidFill>
@@ -4426,31 +4460,7 @@
                 <a:cs typeface="Open Sans" panose="020B0606030504020204" pitchFamily="34" charset="0"/>
                 <a:hlinkClick r:id="rId4"/>
               </a:rPr>
-              <a:t>(Microsoft </a:t>
-            </a:r>
-            <a:r>
-              <a:rPr lang="en-AU" sz="2600" dirty="0" err="1" smtClean="0">
-                <a:solidFill>
-                  <a:srgbClr val="111111"/>
-                </a:solidFill>
-                <a:latin typeface="Open Sans" panose="020B0606030504020204" pitchFamily="34" charset="0"/>
-                <a:ea typeface="Open Sans" panose="020B0606030504020204" pitchFamily="34" charset="0"/>
-                <a:cs typeface="Open Sans" panose="020B0606030504020204" pitchFamily="34" charset="0"/>
-                <a:hlinkClick r:id="rId4"/>
-              </a:rPr>
-              <a:t>n.d.</a:t>
-            </a:r>
-            <a:r>
-              <a:rPr lang="en-AU" sz="2600" dirty="0" smtClean="0">
-                <a:solidFill>
-                  <a:srgbClr val="111111"/>
-                </a:solidFill>
-                <a:latin typeface="Open Sans" panose="020B0606030504020204" pitchFamily="34" charset="0"/>
-                <a:ea typeface="Open Sans" panose="020B0606030504020204" pitchFamily="34" charset="0"/>
-                <a:cs typeface="Open Sans" panose="020B0606030504020204" pitchFamily="34" charset="0"/>
-                <a:hlinkClick r:id="rId4"/>
-              </a:rPr>
-              <a:t>-a)</a:t>
+              <a:t>(Microsoft n.d.-a)</a:t>
             </a:r>
             <a:endParaRPr lang="en-AU" sz="2600" dirty="0" smtClean="0">
               <a:solidFill>
@@ -6723,7 +6733,19 @@
                 <a:cs typeface="Open Sans" panose="020B0606030504020204" pitchFamily="34" charset="0"/>
                 <a:hlinkClick r:id="rId2"/>
               </a:rPr>
-              <a:t>(Microsoft, 2005)</a:t>
+              <a:t>(Microsoft, </a:t>
+            </a:r>
+            <a:r>
+              <a:rPr lang="en-AU" sz="2600" dirty="0" smtClean="0">
+                <a:solidFill>
+                  <a:srgbClr val="111111"/>
+                </a:solidFill>
+                <a:latin typeface="Open Sans" panose="020B0606030504020204" pitchFamily="34" charset="0"/>
+                <a:ea typeface="Open Sans" panose="020B0606030504020204" pitchFamily="34" charset="0"/>
+                <a:cs typeface="Open Sans" panose="020B0606030504020204" pitchFamily="34" charset="0"/>
+                <a:hlinkClick r:id="rId2"/>
+              </a:rPr>
+              <a:t>2005b)</a:t>
             </a:r>
             <a:endParaRPr lang="en-AU" sz="2600" dirty="0" smtClean="0">
               <a:solidFill>
@@ -8688,7 +8710,18 @@
                 <a:ea typeface="Open Sans" panose="020B0606030504020204" pitchFamily="34" charset="0"/>
                 <a:cs typeface="Open Sans" panose="020B0606030504020204" pitchFamily="34" charset="0"/>
               </a:rPr>
-              <a:t>Mitigates vulnerabilities in software</a:t>
+              <a:t>Mitigate </a:t>
+            </a:r>
+            <a:r>
+              <a:rPr lang="en-AU" sz="2600" dirty="0" smtClean="0">
+                <a:solidFill>
+                  <a:srgbClr val="111111"/>
+                </a:solidFill>
+                <a:latin typeface="Open Sans" panose="020B0606030504020204" pitchFamily="34" charset="0"/>
+                <a:ea typeface="Open Sans" panose="020B0606030504020204" pitchFamily="34" charset="0"/>
+                <a:cs typeface="Open Sans" panose="020B0606030504020204" pitchFamily="34" charset="0"/>
+              </a:rPr>
+              <a:t>vulnerabilities in software</a:t>
             </a:r>
           </a:p>
           <a:p>
@@ -8742,8 +8775,27 @@
                 <a:ea typeface="Open Sans" panose="020B0606030504020204" pitchFamily="34" charset="0"/>
                 <a:cs typeface="Open Sans" panose="020B0606030504020204" pitchFamily="34" charset="0"/>
               </a:rPr>
-              <a:t>Manage patching for multiple computers</a:t>
-            </a:r>
+              <a:t>Manage </a:t>
+            </a:r>
+            <a:r>
+              <a:rPr lang="en-AU" sz="2600" dirty="0" smtClean="0">
+                <a:solidFill>
+                  <a:srgbClr val="111111"/>
+                </a:solidFill>
+                <a:latin typeface="Open Sans" panose="020B0606030504020204" pitchFamily="34" charset="0"/>
+                <a:ea typeface="Open Sans" panose="020B0606030504020204" pitchFamily="34" charset="0"/>
+                <a:cs typeface="Open Sans" panose="020B0606030504020204" pitchFamily="34" charset="0"/>
+              </a:rPr>
+              <a:t>patching in large computer network</a:t>
+            </a:r>
+            <a:endParaRPr lang="en-AU" sz="2600" dirty="0" smtClean="0">
+              <a:solidFill>
+                <a:srgbClr val="111111"/>
+              </a:solidFill>
+              <a:latin typeface="Open Sans" panose="020B0606030504020204" pitchFamily="34" charset="0"/>
+              <a:ea typeface="Open Sans" panose="020B0606030504020204" pitchFamily="34" charset="0"/>
+              <a:cs typeface="Open Sans" panose="020B0606030504020204" pitchFamily="34" charset="0"/>
+            </a:endParaRPr>
           </a:p>
         </p:txBody>
       </p:sp>
@@ -8905,7 +8957,18 @@
                 <a:ea typeface="Open Sans" panose="020B0606030504020204" pitchFamily="34" charset="0"/>
                 <a:cs typeface="Open Sans" panose="020B0606030504020204" pitchFamily="34" charset="0"/>
               </a:rPr>
-              <a:t>Prevents users from writing passwords down</a:t>
+              <a:t>Prevent </a:t>
+            </a:r>
+            <a:r>
+              <a:rPr lang="en-AU" sz="2600" dirty="0" smtClean="0">
+                <a:solidFill>
+                  <a:srgbClr val="111111"/>
+                </a:solidFill>
+                <a:latin typeface="Open Sans" panose="020B0606030504020204" pitchFamily="34" charset="0"/>
+                <a:ea typeface="Open Sans" panose="020B0606030504020204" pitchFamily="34" charset="0"/>
+                <a:cs typeface="Open Sans" panose="020B0606030504020204" pitchFamily="34" charset="0"/>
+              </a:rPr>
+              <a:t>users from writing passwords down</a:t>
             </a:r>
           </a:p>
         </p:txBody>
@@ -9579,7 +9642,7 @@
         </p:spPr>
         <p:txBody>
           <a:bodyPr vert="horz" lIns="91440" tIns="45720" rIns="91440" bIns="45720" rtlCol="0" anchor="t">
-            <a:normAutofit/>
+            <a:normAutofit lnSpcReduction="10000"/>
           </a:bodyPr>
           <a:lstStyle>
             <a:lvl1pPr algn="ctr" defTabSz="914400" rtl="0" eaLnBrk="1" latinLnBrk="0" hangingPunct="1">
@@ -9700,7 +9763,7 @@
                 <a:ea typeface="Open Sans" panose="020B0606030504020204" pitchFamily="34" charset="0"/>
                 <a:cs typeface="Open Sans" panose="020B0606030504020204" pitchFamily="34" charset="0"/>
               </a:rPr>
-              <a:t>Microsoft. (2005a). Apply or modify password policy: Logon and Authentication. Retrieved May 14, 2015, from </a:t>
+              <a:t>Machkovech, S. (2015). Hacked French network exposed its own passwords during TV interview | Ars Technica. Ars Technica. Retrieved May 6, 2015, from </a:t>
             </a:r>
             <a:r>
               <a:rPr lang="en-AU" sz="1400" dirty="0">
@@ -9712,7 +9775,7 @@
                 <a:cs typeface="Open Sans" panose="020B0606030504020204" pitchFamily="34" charset="0"/>
                 <a:hlinkClick r:id="rId3"/>
               </a:rPr>
-              <a:t>https://technet.microsoft.com/en-au/library/cc781633(v=ws.10).aspx?f=255&amp;MSPPError=-</a:t>
+              <a:t>http://arstechnica.com/security/2015/04/09/hacked-french-network-exposed-its-own-passwords-during-tv-interview</a:t>
             </a:r>
             <a:r>
               <a:rPr lang="en-AU" sz="1400" dirty="0" smtClean="0">
@@ -9724,7 +9787,7 @@
                 <a:cs typeface="Open Sans" panose="020B0606030504020204" pitchFamily="34" charset="0"/>
                 <a:hlinkClick r:id="rId3"/>
               </a:rPr>
-              <a:t>2147217396#BKMK_3</a:t>
+              <a:t>/</a:t>
             </a:r>
             <a:endParaRPr lang="en-AU" sz="1400" dirty="0" smtClean="0">
               <a:solidFill>
@@ -9752,7 +9815,18 @@
                 <a:ea typeface="Open Sans" panose="020B0606030504020204" pitchFamily="34" charset="0"/>
                 <a:cs typeface="Open Sans" panose="020B0606030504020204" pitchFamily="34" charset="0"/>
               </a:rPr>
-              <a:t>Microsoft. (2007). Configure UAC settings via policy - Microsoft Reduce Customer Effort Center - Site Home - TechNet Blogs. Retrieved May 14, 2015, from </a:t>
+              <a:t>Microsoft. (</a:t>
+            </a:r>
+            <a:r>
+              <a:rPr lang="en-AU" sz="1400" dirty="0" smtClean="0">
+                <a:solidFill>
+                  <a:srgbClr val="111111"/>
+                </a:solidFill>
+                <a:latin typeface="Open Sans" panose="020B0606030504020204" pitchFamily="34" charset="0"/>
+                <a:ea typeface="Open Sans" panose="020B0606030504020204" pitchFamily="34" charset="0"/>
+                <a:cs typeface="Open Sans" panose="020B0606030504020204" pitchFamily="34" charset="0"/>
+              </a:rPr>
+              <a:t>2005a). </a:t>
             </a:r>
             <a:r>
               <a:rPr lang="en-AU" sz="1400" dirty="0">
@@ -9762,9 +9836,20 @@
                 <a:latin typeface="Open Sans" panose="020B0606030504020204" pitchFamily="34" charset="0"/>
                 <a:ea typeface="Open Sans" panose="020B0606030504020204" pitchFamily="34" charset="0"/>
                 <a:cs typeface="Open Sans" panose="020B0606030504020204" pitchFamily="34" charset="0"/>
+              </a:rPr>
+              <a:t>Apply or modify password policy: Logon and Authentication. Retrieved May 14, 2015, from </a:t>
+            </a:r>
+            <a:r>
+              <a:rPr lang="en-AU" sz="1400" dirty="0">
+                <a:solidFill>
+                  <a:srgbClr val="111111"/>
+                </a:solidFill>
+                <a:latin typeface="Open Sans" panose="020B0606030504020204" pitchFamily="34" charset="0"/>
+                <a:ea typeface="Open Sans" panose="020B0606030504020204" pitchFamily="34" charset="0"/>
+                <a:cs typeface="Open Sans" panose="020B0606030504020204" pitchFamily="34" charset="0"/>
                 <a:hlinkClick r:id="rId4"/>
               </a:rPr>
-              <a:t>http://</a:t>
+              <a:t>https://technet.microsoft.com/en-au/library/cc781633(v=ws.10).aspx?f=255&amp;MSPPError=-</a:t>
             </a:r>
             <a:r>
               <a:rPr lang="en-AU" sz="1400" dirty="0" smtClean="0">
@@ -9776,7 +9861,7 @@
                 <a:cs typeface="Open Sans" panose="020B0606030504020204" pitchFamily="34" charset="0"/>
                 <a:hlinkClick r:id="rId4"/>
               </a:rPr>
-              <a:t>blogs.technet.com/b/asiasupp/archive/2007/02/08/configure-uac-settings-via-policy.aspx</a:t>
+              <a:t>2147217396#BKMK_3</a:t>
             </a:r>
             <a:endParaRPr lang="en-AU" sz="1400" dirty="0" smtClean="0">
               <a:solidFill>
@@ -9804,7 +9889,18 @@
                 <a:ea typeface="Open Sans" panose="020B0606030504020204" pitchFamily="34" charset="0"/>
                 <a:cs typeface="Open Sans" panose="020B0606030504020204" pitchFamily="34" charset="0"/>
               </a:rPr>
-              <a:t>Microsoft. (n.d.-a). Screen Saver timeout. Retrieved May 14, 2015, from </a:t>
+              <a:t>Microsoft. (</a:t>
+            </a:r>
+            <a:r>
+              <a:rPr lang="en-AU" sz="1400" dirty="0" smtClean="0">
+                <a:solidFill>
+                  <a:srgbClr val="111111"/>
+                </a:solidFill>
+                <a:latin typeface="Open Sans" panose="020B0606030504020204" pitchFamily="34" charset="0"/>
+                <a:ea typeface="Open Sans" panose="020B0606030504020204" pitchFamily="34" charset="0"/>
+                <a:cs typeface="Open Sans" panose="020B0606030504020204" pitchFamily="34" charset="0"/>
+              </a:rPr>
+              <a:t>2005b). </a:t>
             </a:r>
             <a:r>
               <a:rPr lang="en-AU" sz="1400" dirty="0">
@@ -9814,9 +9910,20 @@
                 <a:latin typeface="Open Sans" panose="020B0606030504020204" pitchFamily="34" charset="0"/>
                 <a:ea typeface="Open Sans" panose="020B0606030504020204" pitchFamily="34" charset="0"/>
                 <a:cs typeface="Open Sans" panose="020B0606030504020204" pitchFamily="34" charset="0"/>
+              </a:rPr>
+              <a:t>Assign user rights to a group in Active Directory: Active Directory. Retrieved May 14, 2015, from </a:t>
+            </a:r>
+            <a:r>
+              <a:rPr lang="en-AU" sz="1400" dirty="0">
+                <a:solidFill>
+                  <a:srgbClr val="111111"/>
+                </a:solidFill>
+                <a:latin typeface="Open Sans" panose="020B0606030504020204" pitchFamily="34" charset="0"/>
+                <a:ea typeface="Open Sans" panose="020B0606030504020204" pitchFamily="34" charset="0"/>
+                <a:cs typeface="Open Sans" panose="020B0606030504020204" pitchFamily="34" charset="0"/>
                 <a:hlinkClick r:id="rId5"/>
               </a:rPr>
-              <a:t>https://</a:t>
+              <a:t>https://technet.microsoft.com/en-au/library/cc786658(v=ws.10).</a:t>
             </a:r>
             <a:r>
               <a:rPr lang="en-AU" sz="1400" dirty="0" smtClean="0">
@@ -9828,7 +9935,7 @@
                 <a:cs typeface="Open Sans" panose="020B0606030504020204" pitchFamily="34" charset="0"/>
                 <a:hlinkClick r:id="rId5"/>
               </a:rPr>
-              <a:t>technet.microsoft.com/en-us/library/cc961876.aspx</a:t>
+              <a:t>aspx</a:t>
             </a:r>
             <a:endParaRPr lang="en-AU" sz="1400" dirty="0" smtClean="0">
               <a:solidFill>
@@ -9848,6 +9955,17 @@
               <a:buChar char="•"/>
             </a:pPr>
             <a:r>
+              <a:rPr lang="en-AU" sz="1400" dirty="0" smtClean="0">
+                <a:solidFill>
+                  <a:srgbClr val="111111"/>
+                </a:solidFill>
+                <a:latin typeface="Open Sans" panose="020B0606030504020204" pitchFamily="34" charset="0"/>
+                <a:ea typeface="Open Sans" panose="020B0606030504020204" pitchFamily="34" charset="0"/>
+                <a:cs typeface="Open Sans" panose="020B0606030504020204" pitchFamily="34" charset="0"/>
+              </a:rPr>
+              <a:t>Microsoft</a:t>
+            </a:r>
+            <a:r>
               <a:rPr lang="en-AU" sz="1400" dirty="0">
                 <a:solidFill>
                   <a:srgbClr val="111111"/>
@@ -9856,7 +9974,7 @@
                 <a:ea typeface="Open Sans" panose="020B0606030504020204" pitchFamily="34" charset="0"/>
                 <a:cs typeface="Open Sans" panose="020B0606030504020204" pitchFamily="34" charset="0"/>
               </a:rPr>
-              <a:t>Microsoft. (n.d.-b). What is User Account Control? - Windows Help. Retrieved March 14, 2015, from </a:t>
+              <a:t>. (2007). Configure UAC settings via policy - Microsoft Reduce Customer Effort Center - Site Home - TechNet Blogs. Retrieved May 14, 2015, from </a:t>
             </a:r>
             <a:r>
               <a:rPr lang="en-AU" sz="1400" dirty="0">
@@ -9880,7 +9998,7 @@
                 <a:cs typeface="Open Sans" panose="020B0606030504020204" pitchFamily="34" charset="0"/>
                 <a:hlinkClick r:id="rId6"/>
               </a:rPr>
-              <a:t>windows.microsoft.com/en-au/windows/what-is-user-account-control#1TC=windows-vista</a:t>
+              <a:t>blogs.technet.com/b/asiasupp/archive/2007/02/08/configure-uac-settings-via-policy.aspx</a:t>
             </a:r>
             <a:endParaRPr lang="en-AU" sz="1400" dirty="0" smtClean="0">
               <a:solidFill>
@@ -9908,7 +10026,7 @@
                 <a:ea typeface="Open Sans" panose="020B0606030504020204" pitchFamily="34" charset="0"/>
                 <a:cs typeface="Open Sans" panose="020B0606030504020204" pitchFamily="34" charset="0"/>
               </a:rPr>
-              <a:t>Oliver, J., &amp; Snowden, E. [LastWeekTonight]. (2015, April 9). Last Week Tonight with John Oliver: Edward Snowden on Passwords. Retrieved May 6, 2015, from </a:t>
+              <a:t>Microsoft. (2012). Password must meet complexity requirements. Retrieved May 14, 2015, from </a:t>
             </a:r>
             <a:r>
               <a:rPr lang="en-AU" sz="1400" dirty="0">
@@ -9920,7 +10038,7 @@
                 <a:cs typeface="Open Sans" panose="020B0606030504020204" pitchFamily="34" charset="0"/>
                 <a:hlinkClick r:id="rId7"/>
               </a:rPr>
-              <a:t>https://</a:t>
+              <a:t>https://technet.microsoft.com/en-us/library/hh994562(v=ws.10).</a:t>
             </a:r>
             <a:r>
               <a:rPr lang="en-AU" sz="1400" dirty="0" smtClean="0">
@@ -9932,7 +10050,7 @@
                 <a:cs typeface="Open Sans" panose="020B0606030504020204" pitchFamily="34" charset="0"/>
                 <a:hlinkClick r:id="rId7"/>
               </a:rPr>
-              <a:t>www.youtube.com/watch?v=yzGzB-yYKcc</a:t>
+              <a:t>aspx</a:t>
             </a:r>
             <a:endParaRPr lang="en-AU" sz="1400" dirty="0" smtClean="0">
               <a:solidFill>
@@ -9960,7 +10078,19 @@
                 <a:ea typeface="Open Sans" panose="020B0606030504020204" pitchFamily="34" charset="0"/>
                 <a:cs typeface="Open Sans" panose="020B0606030504020204" pitchFamily="34" charset="0"/>
               </a:rPr>
-              <a:t>Scarfone, K., &amp; Souppaya, M. (2013). Guide to Enterprise Patch Management Technologies NIST Special Publication 800-40 Guide to Enterprise Patch Management Technologies. NIST. </a:t>
+              <a:t>Microsoft. (n.d.-a). Screen Saver timeout. Retrieved May 14, 2015, from </a:t>
+            </a:r>
+            <a:r>
+              <a:rPr lang="en-AU" sz="1400" dirty="0">
+                <a:solidFill>
+                  <a:srgbClr val="111111"/>
+                </a:solidFill>
+                <a:latin typeface="Open Sans" panose="020B0606030504020204" pitchFamily="34" charset="0"/>
+                <a:ea typeface="Open Sans" panose="020B0606030504020204" pitchFamily="34" charset="0"/>
+                <a:cs typeface="Open Sans" panose="020B0606030504020204" pitchFamily="34" charset="0"/>
+                <a:hlinkClick r:id="rId8"/>
+              </a:rPr>
+              <a:t>https://</a:t>
             </a:r>
             <a:r>
               <a:rPr lang="en-AU" sz="1400" dirty="0" smtClean="0">
@@ -9970,9 +10100,18 @@
                 <a:latin typeface="Open Sans" panose="020B0606030504020204" pitchFamily="34" charset="0"/>
                 <a:ea typeface="Open Sans" panose="020B0606030504020204" pitchFamily="34" charset="0"/>
                 <a:cs typeface="Open Sans" panose="020B0606030504020204" pitchFamily="34" charset="0"/>
-              </a:rPr>
-              <a:t>doi:10.6028/NIST.SP.800-40r3</a:t>
-            </a:r>
+                <a:hlinkClick r:id="rId8"/>
+              </a:rPr>
+              <a:t>technet.microsoft.com/en-us/library/cc961876.aspx</a:t>
+            </a:r>
+            <a:endParaRPr lang="en-AU" sz="1400" dirty="0" smtClean="0">
+              <a:solidFill>
+                <a:srgbClr val="111111"/>
+              </a:solidFill>
+              <a:latin typeface="Open Sans" panose="020B0606030504020204" pitchFamily="34" charset="0"/>
+              <a:ea typeface="Open Sans" panose="020B0606030504020204" pitchFamily="34" charset="0"/>
+              <a:cs typeface="Open Sans" panose="020B0606030504020204" pitchFamily="34" charset="0"/>
+            </a:endParaRPr>
           </a:p>
           <a:p>
             <a:pPr marL="457200" indent="-457200" algn="l">
@@ -9991,6 +10130,193 @@
                 <a:ea typeface="Open Sans" panose="020B0606030504020204" pitchFamily="34" charset="0"/>
                 <a:cs typeface="Open Sans" panose="020B0606030504020204" pitchFamily="34" charset="0"/>
               </a:rPr>
+              <a:t>Microsoft. (n.d.-b). What is User Account Control? - Windows Help. Retrieved March 14, 2015, from </a:t>
+            </a:r>
+            <a:r>
+              <a:rPr lang="en-AU" sz="1400" dirty="0">
+                <a:solidFill>
+                  <a:srgbClr val="111111"/>
+                </a:solidFill>
+                <a:latin typeface="Open Sans" panose="020B0606030504020204" pitchFamily="34" charset="0"/>
+                <a:ea typeface="Open Sans" panose="020B0606030504020204" pitchFamily="34" charset="0"/>
+                <a:cs typeface="Open Sans" panose="020B0606030504020204" pitchFamily="34" charset="0"/>
+                <a:hlinkClick r:id="rId9"/>
+              </a:rPr>
+              <a:t>http://</a:t>
+            </a:r>
+            <a:r>
+              <a:rPr lang="en-AU" sz="1400" dirty="0" smtClean="0">
+                <a:solidFill>
+                  <a:srgbClr val="111111"/>
+                </a:solidFill>
+                <a:latin typeface="Open Sans" panose="020B0606030504020204" pitchFamily="34" charset="0"/>
+                <a:ea typeface="Open Sans" panose="020B0606030504020204" pitchFamily="34" charset="0"/>
+                <a:cs typeface="Open Sans" panose="020B0606030504020204" pitchFamily="34" charset="0"/>
+                <a:hlinkClick r:id="rId9"/>
+              </a:rPr>
+              <a:t>windows.microsoft.com/en-au/windows/what-is-user-account-control#1TC=windows-vista</a:t>
+            </a:r>
+            <a:endParaRPr lang="en-AU" sz="1400" dirty="0" smtClean="0">
+              <a:solidFill>
+                <a:srgbClr val="111111"/>
+              </a:solidFill>
+              <a:latin typeface="Open Sans" panose="020B0606030504020204" pitchFamily="34" charset="0"/>
+              <a:ea typeface="Open Sans" panose="020B0606030504020204" pitchFamily="34" charset="0"/>
+              <a:cs typeface="Open Sans" panose="020B0606030504020204" pitchFamily="34" charset="0"/>
+            </a:endParaRPr>
+          </a:p>
+          <a:p>
+            <a:pPr marL="457200" indent="-457200" algn="l">
+              <a:lnSpc>
+                <a:spcPct val="100000"/>
+              </a:lnSpc>
+              <a:buFont typeface="Arial" panose="020B0604020202020204" pitchFamily="34" charset="0"/>
+              <a:buChar char="•"/>
+            </a:pPr>
+            <a:r>
+              <a:rPr lang="en-AU" sz="1400" dirty="0">
+                <a:solidFill>
+                  <a:srgbClr val="111111"/>
+                </a:solidFill>
+                <a:latin typeface="Open Sans" panose="020B0606030504020204" pitchFamily="34" charset="0"/>
+                <a:ea typeface="Open Sans" panose="020B0606030504020204" pitchFamily="34" charset="0"/>
+                <a:cs typeface="Open Sans" panose="020B0606030504020204" pitchFamily="34" charset="0"/>
+              </a:rPr>
+              <a:t>O’Connor, E. (2008). BigAdmin Feature Article: Patch Management Best Practices. Retrieved May 13, 2015, from </a:t>
+            </a:r>
+            <a:r>
+              <a:rPr lang="en-AU" sz="1400" dirty="0">
+                <a:solidFill>
+                  <a:srgbClr val="111111"/>
+                </a:solidFill>
+                <a:latin typeface="Open Sans" panose="020B0606030504020204" pitchFamily="34" charset="0"/>
+                <a:ea typeface="Open Sans" panose="020B0606030504020204" pitchFamily="34" charset="0"/>
+                <a:cs typeface="Open Sans" panose="020B0606030504020204" pitchFamily="34" charset="0"/>
+                <a:hlinkClick r:id="rId10"/>
+              </a:rPr>
+              <a:t>http://</a:t>
+            </a:r>
+            <a:r>
+              <a:rPr lang="en-AU" sz="1400" dirty="0" smtClean="0">
+                <a:solidFill>
+                  <a:srgbClr val="111111"/>
+                </a:solidFill>
+                <a:latin typeface="Open Sans" panose="020B0606030504020204" pitchFamily="34" charset="0"/>
+                <a:ea typeface="Open Sans" panose="020B0606030504020204" pitchFamily="34" charset="0"/>
+                <a:cs typeface="Open Sans" panose="020B0606030504020204" pitchFamily="34" charset="0"/>
+                <a:hlinkClick r:id="rId10"/>
+              </a:rPr>
+              <a:t>www.oracle.com/technetwork/systems/articles/patch-management-jsp-135385.html</a:t>
+            </a:r>
+            <a:endParaRPr lang="en-AU" sz="1400" dirty="0" smtClean="0">
+              <a:solidFill>
+                <a:srgbClr val="111111"/>
+              </a:solidFill>
+              <a:latin typeface="Open Sans" panose="020B0606030504020204" pitchFamily="34" charset="0"/>
+              <a:ea typeface="Open Sans" panose="020B0606030504020204" pitchFamily="34" charset="0"/>
+              <a:cs typeface="Open Sans" panose="020B0606030504020204" pitchFamily="34" charset="0"/>
+            </a:endParaRPr>
+          </a:p>
+          <a:p>
+            <a:pPr marL="457200" indent="-457200" algn="l">
+              <a:lnSpc>
+                <a:spcPct val="100000"/>
+              </a:lnSpc>
+              <a:buFont typeface="Arial" panose="020B0604020202020204" pitchFamily="34" charset="0"/>
+              <a:buChar char="•"/>
+            </a:pPr>
+            <a:r>
+              <a:rPr lang="en-AU" sz="1400" dirty="0">
+                <a:solidFill>
+                  <a:srgbClr val="111111"/>
+                </a:solidFill>
+                <a:latin typeface="Open Sans" panose="020B0606030504020204" pitchFamily="34" charset="0"/>
+                <a:ea typeface="Open Sans" panose="020B0606030504020204" pitchFamily="34" charset="0"/>
+                <a:cs typeface="Open Sans" panose="020B0606030504020204" pitchFamily="34" charset="0"/>
+              </a:rPr>
+              <a:t>Oliver, J., &amp; Snowden, E. [LastWeekTonight]. (2015, April 9). Last Week Tonight with John Oliver: Edward Snowden on Passwords. Retrieved May 6, 2015, from </a:t>
+            </a:r>
+            <a:r>
+              <a:rPr lang="en-AU" sz="1400" dirty="0">
+                <a:solidFill>
+                  <a:srgbClr val="111111"/>
+                </a:solidFill>
+                <a:latin typeface="Open Sans" panose="020B0606030504020204" pitchFamily="34" charset="0"/>
+                <a:ea typeface="Open Sans" panose="020B0606030504020204" pitchFamily="34" charset="0"/>
+                <a:cs typeface="Open Sans" panose="020B0606030504020204" pitchFamily="34" charset="0"/>
+                <a:hlinkClick r:id="rId11"/>
+              </a:rPr>
+              <a:t>https://</a:t>
+            </a:r>
+            <a:r>
+              <a:rPr lang="en-AU" sz="1400" dirty="0" smtClean="0">
+                <a:solidFill>
+                  <a:srgbClr val="111111"/>
+                </a:solidFill>
+                <a:latin typeface="Open Sans" panose="020B0606030504020204" pitchFamily="34" charset="0"/>
+                <a:ea typeface="Open Sans" panose="020B0606030504020204" pitchFamily="34" charset="0"/>
+                <a:cs typeface="Open Sans" panose="020B0606030504020204" pitchFamily="34" charset="0"/>
+                <a:hlinkClick r:id="rId11"/>
+              </a:rPr>
+              <a:t>www.youtube.com/watch?v=yzGzB-yYKcc</a:t>
+            </a:r>
+            <a:endParaRPr lang="en-AU" sz="1400" dirty="0" smtClean="0">
+              <a:solidFill>
+                <a:srgbClr val="111111"/>
+              </a:solidFill>
+              <a:latin typeface="Open Sans" panose="020B0606030504020204" pitchFamily="34" charset="0"/>
+              <a:ea typeface="Open Sans" panose="020B0606030504020204" pitchFamily="34" charset="0"/>
+              <a:cs typeface="Open Sans" panose="020B0606030504020204" pitchFamily="34" charset="0"/>
+            </a:endParaRPr>
+          </a:p>
+          <a:p>
+            <a:pPr marL="457200" indent="-457200" algn="l">
+              <a:lnSpc>
+                <a:spcPct val="100000"/>
+              </a:lnSpc>
+              <a:buFont typeface="Arial" panose="020B0604020202020204" pitchFamily="34" charset="0"/>
+              <a:buChar char="•"/>
+            </a:pPr>
+            <a:r>
+              <a:rPr lang="en-AU" sz="1400" dirty="0">
+                <a:solidFill>
+                  <a:srgbClr val="111111"/>
+                </a:solidFill>
+                <a:latin typeface="Open Sans" panose="020B0606030504020204" pitchFamily="34" charset="0"/>
+                <a:ea typeface="Open Sans" panose="020B0606030504020204" pitchFamily="34" charset="0"/>
+                <a:cs typeface="Open Sans" panose="020B0606030504020204" pitchFamily="34" charset="0"/>
+              </a:rPr>
+              <a:t>Scarfone, K., &amp; Souppaya, M. (2013). Guide to Enterprise Patch Management Technologies NIST Special Publication 800-40 Guide to Enterprise Patch Management Technologies. NIST. </a:t>
+            </a:r>
+            <a:r>
+              <a:rPr lang="en-AU" sz="1400" dirty="0" smtClean="0">
+                <a:solidFill>
+                  <a:srgbClr val="111111"/>
+                </a:solidFill>
+                <a:latin typeface="Open Sans" panose="020B0606030504020204" pitchFamily="34" charset="0"/>
+                <a:ea typeface="Open Sans" panose="020B0606030504020204" pitchFamily="34" charset="0"/>
+                <a:cs typeface="Open Sans" panose="020B0606030504020204" pitchFamily="34" charset="0"/>
+              </a:rPr>
+              <a:t>doi:10.6028/NIST.SP.800-40r3</a:t>
+            </a:r>
+          </a:p>
+          <a:p>
+            <a:pPr marL="457200" indent="-457200" algn="l">
+              <a:lnSpc>
+                <a:spcPct val="100000"/>
+              </a:lnSpc>
+              <a:buFont typeface="Arial" panose="020B0604020202020204" pitchFamily="34" charset="0"/>
+              <a:buChar char="•"/>
+            </a:pPr>
+            <a:r>
+              <a:rPr lang="en-AU" sz="1400" dirty="0">
+                <a:solidFill>
+                  <a:srgbClr val="111111"/>
+                </a:solidFill>
+                <a:latin typeface="Open Sans" panose="020B0606030504020204" pitchFamily="34" charset="0"/>
+                <a:ea typeface="Open Sans" panose="020B0606030504020204" pitchFamily="34" charset="0"/>
+                <a:cs typeface="Open Sans" panose="020B0606030504020204" pitchFamily="34" charset="0"/>
+              </a:rPr>
               <a:t>Tice, K. [solarwindsinc]. (2012, September 12)  Patch Manager Guided Tour. Retrieved May 14, 2015, from </a:t>
             </a:r>
             <a:r>
@@ -10001,7 +10327,7 @@
                 <a:latin typeface="Open Sans" panose="020B0606030504020204" pitchFamily="34" charset="0"/>
                 <a:ea typeface="Open Sans" panose="020B0606030504020204" pitchFamily="34" charset="0"/>
                 <a:cs typeface="Open Sans" panose="020B0606030504020204" pitchFamily="34" charset="0"/>
-                <a:hlinkClick r:id="rId8"/>
+                <a:hlinkClick r:id="rId12"/>
               </a:rPr>
               <a:t>https://www.youtube.com/watch?v=-</a:t>
             </a:r>
@@ -10013,7 +10339,7 @@
                 <a:latin typeface="Open Sans" panose="020B0606030504020204" pitchFamily="34" charset="0"/>
                 <a:ea typeface="Open Sans" panose="020B0606030504020204" pitchFamily="34" charset="0"/>
                 <a:cs typeface="Open Sans" panose="020B0606030504020204" pitchFamily="34" charset="0"/>
-                <a:hlinkClick r:id="rId8"/>
+                <a:hlinkClick r:id="rId12"/>
               </a:rPr>
               <a:t>DldViUL1d0</a:t>
             </a:r>

</xml_diff>